<commit_message>
Added the ability to work with the values inside a pie chart
</commit_message>
<xml_diff>
--- a/PowerPointEditorLib.Tests/ppt-examples/test.pptx
+++ b/PowerPointEditorLib.Tests/ppt-examples/test.pptx
@@ -5,12 +5,13 @@
     <p:sldMasterId id="2147483648" r:id="rId1"/>
   </p:sldMasterIdLst>
   <p:notesMasterIdLst>
-    <p:notesMasterId r:id="rId5"/>
+    <p:notesMasterId r:id="rId6"/>
   </p:notesMasterIdLst>
   <p:sldIdLst>
     <p:sldId id="256" r:id="rId2"/>
     <p:sldId id="257" r:id="rId3"/>
     <p:sldId id="258" r:id="rId4"/>
+    <p:sldId id="259" r:id="rId5"/>
   </p:sldIdLst>
   <p:sldSz cx="12192000" cy="6858000"/>
   <p:notesSz cx="6858000" cy="9144000"/>
@@ -574,7 +575,301 @@
 </c:chartSpace>
 </file>
 
+<file path=ppt/charts/chart2.xml><?xml version="1.0" encoding="utf-8"?>
+<c:chartSpace xmlns:c="http://schemas.openxmlformats.org/drawingml/2006/chart" xmlns:a="http://schemas.openxmlformats.org/drawingml/2006/main" xmlns:r="http://schemas.openxmlformats.org/officeDocument/2006/relationships" xmlns:c16r2="http://schemas.microsoft.com/office/drawing/2015/06/chart">
+  <c:date1904 val="0"/>
+  <c:lang val="en-US"/>
+  <c:roundedCorners val="0"/>
+  <mc:AlternateContent xmlns:mc="http://schemas.openxmlformats.org/markup-compatibility/2006">
+    <mc:Choice xmlns:c14="http://schemas.microsoft.com/office/drawing/2007/8/2/chart" Requires="c14">
+      <c14:style val="102"/>
+    </mc:Choice>
+    <mc:Fallback>
+      <c:style val="2"/>
+    </mc:Fallback>
+  </mc:AlternateContent>
+  <c:chart>
+    <c:title>
+      <c:overlay val="0"/>
+      <c:spPr>
+        <a:noFill/>
+        <a:ln>
+          <a:noFill/>
+        </a:ln>
+        <a:effectLst/>
+      </c:spPr>
+      <c:txPr>
+        <a:bodyPr rot="0" spcFirstLastPara="1" vertOverflow="ellipsis" vert="horz" wrap="square" anchor="ctr" anchorCtr="1"/>
+        <a:lstStyle/>
+        <a:p>
+          <a:pPr>
+            <a:defRPr sz="1862" b="0" i="0" u="none" strike="noStrike" kern="1200" spc="0" baseline="0">
+              <a:solidFill>
+                <a:schemeClr val="tx1">
+                  <a:lumMod val="65000"/>
+                  <a:lumOff val="35000"/>
+                </a:schemeClr>
+              </a:solidFill>
+              <a:latin typeface="+mn-lt"/>
+              <a:ea typeface="+mn-ea"/>
+              <a:cs typeface="+mn-cs"/>
+            </a:defRPr>
+          </a:pPr>
+          <a:endParaRPr lang="en-US"/>
+        </a:p>
+      </c:txPr>
+    </c:title>
+    <c:autoTitleDeleted val="0"/>
+    <c:plotArea>
+      <c:layout/>
+      <c:pieChart>
+        <c:varyColors val="1"/>
+        <c:ser>
+          <c:idx val="0"/>
+          <c:order val="0"/>
+          <c:tx>
+            <c:strRef>
+              <c:f>Sheet1!$B$1</c:f>
+              <c:strCache>
+                <c:ptCount val="1"/>
+                <c:pt idx="0">
+                  <c:v>Sales</c:v>
+                </c:pt>
+              </c:strCache>
+            </c:strRef>
+          </c:tx>
+          <c:dPt>
+            <c:idx val="0"/>
+            <c:bubble3D val="0"/>
+            <c:spPr>
+              <a:solidFill>
+                <a:schemeClr val="accent1"/>
+              </a:solidFill>
+              <a:ln w="19050">
+                <a:solidFill>
+                  <a:schemeClr val="lt1"/>
+                </a:solidFill>
+              </a:ln>
+              <a:effectLst/>
+            </c:spPr>
+          </c:dPt>
+          <c:dPt>
+            <c:idx val="1"/>
+            <c:bubble3D val="0"/>
+            <c:spPr>
+              <a:solidFill>
+                <a:schemeClr val="accent2"/>
+              </a:solidFill>
+              <a:ln w="19050">
+                <a:solidFill>
+                  <a:schemeClr val="lt1"/>
+                </a:solidFill>
+              </a:ln>
+              <a:effectLst/>
+            </c:spPr>
+          </c:dPt>
+          <c:dPt>
+            <c:idx val="2"/>
+            <c:bubble3D val="0"/>
+            <c:spPr>
+              <a:solidFill>
+                <a:schemeClr val="accent3"/>
+              </a:solidFill>
+              <a:ln w="19050">
+                <a:solidFill>
+                  <a:schemeClr val="lt1"/>
+                </a:solidFill>
+              </a:ln>
+              <a:effectLst/>
+            </c:spPr>
+          </c:dPt>
+          <c:dPt>
+            <c:idx val="3"/>
+            <c:bubble3D val="0"/>
+            <c:spPr>
+              <a:solidFill>
+                <a:schemeClr val="accent4"/>
+              </a:solidFill>
+              <a:ln w="19050">
+                <a:solidFill>
+                  <a:schemeClr val="lt1"/>
+                </a:solidFill>
+              </a:ln>
+              <a:effectLst/>
+            </c:spPr>
+          </c:dPt>
+          <c:cat>
+            <c:strRef>
+              <c:f>Sheet1!$A$2:$A$5</c:f>
+              <c:strCache>
+                <c:ptCount val="4"/>
+                <c:pt idx="0">
+                  <c:v>1st Qtr</c:v>
+                </c:pt>
+                <c:pt idx="1">
+                  <c:v>2nd Qtr</c:v>
+                </c:pt>
+                <c:pt idx="2">
+                  <c:v>3rd Qtr</c:v>
+                </c:pt>
+                <c:pt idx="3">
+                  <c:v>4th Qtr</c:v>
+                </c:pt>
+              </c:strCache>
+            </c:strRef>
+          </c:cat>
+          <c:val>
+            <c:numRef>
+              <c:f>Sheet1!$B$2:$B$5</c:f>
+              <c:numCache>
+                <c:formatCode>General</c:formatCode>
+                <c:ptCount val="4"/>
+                <c:pt idx="0">
+                  <c:v>8.1999999999999993</c:v>
+                </c:pt>
+                <c:pt idx="1">
+                  <c:v>3.2</c:v>
+                </c:pt>
+                <c:pt idx="2">
+                  <c:v>1.4</c:v>
+                </c:pt>
+                <c:pt idx="3">
+                  <c:v>1.2</c:v>
+                </c:pt>
+              </c:numCache>
+            </c:numRef>
+          </c:val>
+          <c:extLst>
+            <c:ext xmlns:c16="http://schemas.microsoft.com/office/drawing/2014/chart" uri="{C3380CC4-5D6E-409C-BE32-E72D297353CC}">
+              <c16:uniqueId val="{00000000-E278-442E-8790-50CBC4F4D178}"/>
+            </c:ext>
+          </c:extLst>
+        </c:ser>
+        <c:dLbls>
+          <c:showLegendKey val="0"/>
+          <c:showVal val="0"/>
+          <c:showCatName val="0"/>
+          <c:showSerName val="0"/>
+          <c:showPercent val="0"/>
+          <c:showBubbleSize val="0"/>
+          <c:showLeaderLines val="1"/>
+        </c:dLbls>
+        <c:firstSliceAng val="0"/>
+      </c:pieChart>
+      <c:spPr>
+        <a:noFill/>
+        <a:ln>
+          <a:noFill/>
+        </a:ln>
+        <a:effectLst/>
+      </c:spPr>
+    </c:plotArea>
+    <c:legend>
+      <c:legendPos val="b"/>
+      <c:overlay val="0"/>
+      <c:spPr>
+        <a:noFill/>
+        <a:ln>
+          <a:noFill/>
+        </a:ln>
+        <a:effectLst/>
+      </c:spPr>
+      <c:txPr>
+        <a:bodyPr rot="0" spcFirstLastPara="1" vertOverflow="ellipsis" vert="horz" wrap="square" anchor="ctr" anchorCtr="1"/>
+        <a:lstStyle/>
+        <a:p>
+          <a:pPr>
+            <a:defRPr sz="1197" b="0" i="0" u="none" strike="noStrike" kern="1200" baseline="0">
+              <a:solidFill>
+                <a:schemeClr val="tx1">
+                  <a:lumMod val="65000"/>
+                  <a:lumOff val="35000"/>
+                </a:schemeClr>
+              </a:solidFill>
+              <a:latin typeface="+mn-lt"/>
+              <a:ea typeface="+mn-ea"/>
+              <a:cs typeface="+mn-cs"/>
+            </a:defRPr>
+          </a:pPr>
+          <a:endParaRPr lang="en-US"/>
+        </a:p>
+      </c:txPr>
+    </c:legend>
+    <c:plotVisOnly val="1"/>
+    <c:dispBlanksAs val="gap"/>
+    <c:extLst>
+      <c:ext xmlns:c16r3="http://schemas.microsoft.com/office/drawing/2017/03/chart" uri="{56B9EC1D-385E-4148-901F-78D8002777C0}">
+        <c16r3:dataDisplayOptions16>
+          <c16r3:dispNaAsBlank val="1"/>
+        </c16r3:dataDisplayOptions16>
+      </c:ext>
+    </c:extLst>
+    <c:showDLblsOverMax val="0"/>
+  </c:chart>
+  <c:spPr>
+    <a:noFill/>
+    <a:ln>
+      <a:noFill/>
+    </a:ln>
+    <a:effectLst/>
+  </c:spPr>
+  <c:txPr>
+    <a:bodyPr/>
+    <a:lstStyle/>
+    <a:p>
+      <a:pPr>
+        <a:defRPr/>
+      </a:pPr>
+      <a:endParaRPr lang="en-US"/>
+    </a:p>
+  </c:txPr>
+  <c:externalData r:id="rId3">
+    <c:autoUpdate val="0"/>
+  </c:externalData>
+</c:chartSpace>
+</file>
+
 <file path=ppt/charts/colors1.xml><?xml version="1.0" encoding="utf-8"?>
+<cs:colorStyle xmlns:cs="http://schemas.microsoft.com/office/drawing/2012/chartStyle" xmlns:a="http://schemas.openxmlformats.org/drawingml/2006/main" meth="cycle" id="10">
+  <a:schemeClr val="accent1"/>
+  <a:schemeClr val="accent2"/>
+  <a:schemeClr val="accent3"/>
+  <a:schemeClr val="accent4"/>
+  <a:schemeClr val="accent5"/>
+  <a:schemeClr val="accent6"/>
+  <cs:variation/>
+  <cs:variation>
+    <a:lumMod val="60000"/>
+  </cs:variation>
+  <cs:variation>
+    <a:lumMod val="80000"/>
+    <a:lumOff val="20000"/>
+  </cs:variation>
+  <cs:variation>
+    <a:lumMod val="80000"/>
+  </cs:variation>
+  <cs:variation>
+    <a:lumMod val="60000"/>
+    <a:lumOff val="40000"/>
+  </cs:variation>
+  <cs:variation>
+    <a:lumMod val="50000"/>
+  </cs:variation>
+  <cs:variation>
+    <a:lumMod val="70000"/>
+    <a:lumOff val="30000"/>
+  </cs:variation>
+  <cs:variation>
+    <a:lumMod val="70000"/>
+  </cs:variation>
+  <cs:variation>
+    <a:lumMod val="50000"/>
+    <a:lumOff val="50000"/>
+  </cs:variation>
+</cs:colorStyle>
+</file>
+
+<file path=ppt/charts/colors2.xml><?xml version="1.0" encoding="utf-8"?>
 <cs:colorStyle xmlns:cs="http://schemas.microsoft.com/office/drawing/2012/chartStyle" xmlns:a="http://schemas.openxmlformats.org/drawingml/2006/main" meth="cycle" id="10">
   <a:schemeClr val="accent1"/>
   <a:schemeClr val="accent2"/>
@@ -1117,6 +1412,525 @@
 </cs:chartStyle>
 </file>
 
+<file path=ppt/charts/style2.xml><?xml version="1.0" encoding="utf-8"?>
+<cs:chartStyle xmlns:cs="http://schemas.microsoft.com/office/drawing/2012/chartStyle" xmlns:a="http://schemas.openxmlformats.org/drawingml/2006/main" id="251">
+  <cs:axisTitle>
+    <cs:lnRef idx="0"/>
+    <cs:fillRef idx="0"/>
+    <cs:effectRef idx="0"/>
+    <cs:fontRef idx="minor">
+      <a:schemeClr val="tx1">
+        <a:lumMod val="65000"/>
+        <a:lumOff val="35000"/>
+      </a:schemeClr>
+    </cs:fontRef>
+    <cs:defRPr sz="1330" kern="1200"/>
+  </cs:axisTitle>
+  <cs:categoryAxis>
+    <cs:lnRef idx="0"/>
+    <cs:fillRef idx="0"/>
+    <cs:effectRef idx="0"/>
+    <cs:fontRef idx="minor">
+      <a:schemeClr val="tx1">
+        <a:lumMod val="65000"/>
+        <a:lumOff val="35000"/>
+      </a:schemeClr>
+    </cs:fontRef>
+    <cs:spPr>
+      <a:ln w="9525" cap="flat" cmpd="sng" algn="ctr">
+        <a:solidFill>
+          <a:schemeClr val="tx1">
+            <a:lumMod val="15000"/>
+            <a:lumOff val="85000"/>
+          </a:schemeClr>
+        </a:solidFill>
+        <a:round/>
+      </a:ln>
+    </cs:spPr>
+    <cs:defRPr sz="1197" kern="1200"/>
+  </cs:categoryAxis>
+  <cs:chartArea mods="allowNoFillOverride allowNoLineOverride">
+    <cs:lnRef idx="0"/>
+    <cs:fillRef idx="0"/>
+    <cs:effectRef idx="0"/>
+    <cs:fontRef idx="minor">
+      <a:schemeClr val="tx1"/>
+    </cs:fontRef>
+    <cs:spPr>
+      <a:solidFill>
+        <a:schemeClr val="bg1"/>
+      </a:solidFill>
+      <a:ln w="9525" cap="flat" cmpd="sng" algn="ctr">
+        <a:solidFill>
+          <a:schemeClr val="tx1">
+            <a:lumMod val="15000"/>
+            <a:lumOff val="85000"/>
+          </a:schemeClr>
+        </a:solidFill>
+        <a:round/>
+      </a:ln>
+    </cs:spPr>
+    <cs:defRPr sz="1197" kern="1200"/>
+  </cs:chartArea>
+  <cs:dataLabel>
+    <cs:lnRef idx="0"/>
+    <cs:fillRef idx="0"/>
+    <cs:effectRef idx="0"/>
+    <cs:fontRef idx="minor">
+      <a:schemeClr val="tx1">
+        <a:lumMod val="75000"/>
+        <a:lumOff val="25000"/>
+      </a:schemeClr>
+    </cs:fontRef>
+    <cs:defRPr sz="1197" kern="1200"/>
+  </cs:dataLabel>
+  <cs:dataLabelCallout>
+    <cs:lnRef idx="0"/>
+    <cs:fillRef idx="0"/>
+    <cs:effectRef idx="0"/>
+    <cs:fontRef idx="minor">
+      <a:schemeClr val="dk1">
+        <a:lumMod val="65000"/>
+        <a:lumOff val="35000"/>
+      </a:schemeClr>
+    </cs:fontRef>
+    <cs:spPr>
+      <a:solidFill>
+        <a:schemeClr val="lt1"/>
+      </a:solidFill>
+      <a:ln>
+        <a:solidFill>
+          <a:schemeClr val="dk1">
+            <a:lumMod val="25000"/>
+            <a:lumOff val="75000"/>
+          </a:schemeClr>
+        </a:solidFill>
+      </a:ln>
+    </cs:spPr>
+    <cs:defRPr sz="1197" kern="1200"/>
+    <cs:bodyPr rot="0" spcFirstLastPara="1" vertOverflow="clip" horzOverflow="clip" vert="horz" wrap="square" lIns="36576" tIns="18288" rIns="36576" bIns="18288" anchor="ctr" anchorCtr="1">
+      <a:spAutoFit/>
+    </cs:bodyPr>
+  </cs:dataLabelCallout>
+  <cs:dataPoint>
+    <cs:lnRef idx="0"/>
+    <cs:fillRef idx="1">
+      <cs:styleClr val="auto"/>
+    </cs:fillRef>
+    <cs:effectRef idx="0"/>
+    <cs:fontRef idx="minor">
+      <a:schemeClr val="tx1"/>
+    </cs:fontRef>
+    <cs:spPr>
+      <a:ln w="19050">
+        <a:solidFill>
+          <a:schemeClr val="lt1"/>
+        </a:solidFill>
+      </a:ln>
+    </cs:spPr>
+  </cs:dataPoint>
+  <cs:dataPoint3D>
+    <cs:lnRef idx="0"/>
+    <cs:fillRef idx="1">
+      <cs:styleClr val="auto"/>
+    </cs:fillRef>
+    <cs:effectRef idx="0"/>
+    <cs:fontRef idx="minor">
+      <a:schemeClr val="tx1"/>
+    </cs:fontRef>
+    <cs:spPr>
+      <a:ln w="25400">
+        <a:solidFill>
+          <a:schemeClr val="lt1"/>
+        </a:solidFill>
+      </a:ln>
+    </cs:spPr>
+  </cs:dataPoint3D>
+  <cs:dataPointLine>
+    <cs:lnRef idx="0">
+      <cs:styleClr val="auto"/>
+    </cs:lnRef>
+    <cs:fillRef idx="0"/>
+    <cs:effectRef idx="0"/>
+    <cs:fontRef idx="minor">
+      <a:schemeClr val="tx1"/>
+    </cs:fontRef>
+    <cs:spPr>
+      <a:ln w="28575" cap="rnd">
+        <a:solidFill>
+          <a:schemeClr val="phClr"/>
+        </a:solidFill>
+        <a:round/>
+      </a:ln>
+    </cs:spPr>
+  </cs:dataPointLine>
+  <cs:dataPointMarker>
+    <cs:lnRef idx="0">
+      <cs:styleClr val="auto"/>
+    </cs:lnRef>
+    <cs:fillRef idx="1">
+      <cs:styleClr val="auto"/>
+    </cs:fillRef>
+    <cs:effectRef idx="0"/>
+    <cs:fontRef idx="minor">
+      <a:schemeClr val="tx1"/>
+    </cs:fontRef>
+    <cs:spPr>
+      <a:ln w="9525">
+        <a:solidFill>
+          <a:schemeClr val="phClr"/>
+        </a:solidFill>
+      </a:ln>
+    </cs:spPr>
+  </cs:dataPointMarker>
+  <cs:dataPointMarkerLayout symbol="circle" size="5"/>
+  <cs:dataPointWireframe>
+    <cs:lnRef idx="0">
+      <cs:styleClr val="auto"/>
+    </cs:lnRef>
+    <cs:fillRef idx="0"/>
+    <cs:effectRef idx="0"/>
+    <cs:fontRef idx="minor">
+      <a:schemeClr val="tx1"/>
+    </cs:fontRef>
+    <cs:spPr>
+      <a:ln w="9525" cap="rnd">
+        <a:solidFill>
+          <a:schemeClr val="phClr"/>
+        </a:solidFill>
+        <a:round/>
+      </a:ln>
+    </cs:spPr>
+  </cs:dataPointWireframe>
+  <cs:dataTable>
+    <cs:lnRef idx="0"/>
+    <cs:fillRef idx="0"/>
+    <cs:effectRef idx="0"/>
+    <cs:fontRef idx="minor">
+      <a:schemeClr val="tx1">
+        <a:lumMod val="65000"/>
+        <a:lumOff val="35000"/>
+      </a:schemeClr>
+    </cs:fontRef>
+    <cs:spPr>
+      <a:noFill/>
+      <a:ln w="9525" cap="flat" cmpd="sng" algn="ctr">
+        <a:solidFill>
+          <a:schemeClr val="tx1">
+            <a:lumMod val="15000"/>
+            <a:lumOff val="85000"/>
+          </a:schemeClr>
+        </a:solidFill>
+        <a:round/>
+      </a:ln>
+    </cs:spPr>
+    <cs:defRPr sz="1197" kern="1200"/>
+  </cs:dataTable>
+  <cs:downBar>
+    <cs:lnRef idx="0"/>
+    <cs:fillRef idx="0"/>
+    <cs:effectRef idx="0"/>
+    <cs:fontRef idx="minor">
+      <a:schemeClr val="tx1"/>
+    </cs:fontRef>
+    <cs:spPr>
+      <a:solidFill>
+        <a:schemeClr val="dk1">
+          <a:lumMod val="75000"/>
+          <a:lumOff val="25000"/>
+        </a:schemeClr>
+      </a:solidFill>
+      <a:ln w="9525" cap="flat" cmpd="sng" algn="ctr">
+        <a:solidFill>
+          <a:schemeClr val="tx1">
+            <a:lumMod val="65000"/>
+            <a:lumOff val="35000"/>
+          </a:schemeClr>
+        </a:solidFill>
+        <a:round/>
+      </a:ln>
+    </cs:spPr>
+  </cs:downBar>
+  <cs:dropLine>
+    <cs:lnRef idx="0"/>
+    <cs:fillRef idx="0"/>
+    <cs:effectRef idx="0"/>
+    <cs:fontRef idx="minor">
+      <a:schemeClr val="tx1"/>
+    </cs:fontRef>
+    <cs:spPr>
+      <a:ln w="9525" cap="flat" cmpd="sng" algn="ctr">
+        <a:solidFill>
+          <a:schemeClr val="tx1">
+            <a:lumMod val="35000"/>
+            <a:lumOff val="65000"/>
+          </a:schemeClr>
+        </a:solidFill>
+        <a:round/>
+      </a:ln>
+    </cs:spPr>
+  </cs:dropLine>
+  <cs:errorBar>
+    <cs:lnRef idx="0"/>
+    <cs:fillRef idx="0"/>
+    <cs:effectRef idx="0"/>
+    <cs:fontRef idx="minor">
+      <a:schemeClr val="tx1"/>
+    </cs:fontRef>
+    <cs:spPr>
+      <a:ln w="9525" cap="flat" cmpd="sng" algn="ctr">
+        <a:solidFill>
+          <a:schemeClr val="tx1">
+            <a:lumMod val="65000"/>
+            <a:lumOff val="35000"/>
+          </a:schemeClr>
+        </a:solidFill>
+        <a:round/>
+      </a:ln>
+    </cs:spPr>
+  </cs:errorBar>
+  <cs:floor>
+    <cs:lnRef idx="0"/>
+    <cs:fillRef idx="0"/>
+    <cs:effectRef idx="0"/>
+    <cs:fontRef idx="minor">
+      <a:schemeClr val="tx1"/>
+    </cs:fontRef>
+    <cs:spPr>
+      <a:noFill/>
+      <a:ln>
+        <a:noFill/>
+      </a:ln>
+    </cs:spPr>
+  </cs:floor>
+  <cs:gridlineMajor>
+    <cs:lnRef idx="0"/>
+    <cs:fillRef idx="0"/>
+    <cs:effectRef idx="0"/>
+    <cs:fontRef idx="minor">
+      <a:schemeClr val="tx1"/>
+    </cs:fontRef>
+    <cs:spPr>
+      <a:ln w="9525" cap="flat" cmpd="sng" algn="ctr">
+        <a:solidFill>
+          <a:schemeClr val="tx1">
+            <a:lumMod val="15000"/>
+            <a:lumOff val="85000"/>
+          </a:schemeClr>
+        </a:solidFill>
+        <a:round/>
+      </a:ln>
+    </cs:spPr>
+  </cs:gridlineMajor>
+  <cs:gridlineMinor>
+    <cs:lnRef idx="0"/>
+    <cs:fillRef idx="0"/>
+    <cs:effectRef idx="0"/>
+    <cs:fontRef idx="minor">
+      <a:schemeClr val="tx1"/>
+    </cs:fontRef>
+    <cs:spPr>
+      <a:ln w="9525" cap="flat" cmpd="sng" algn="ctr">
+        <a:solidFill>
+          <a:schemeClr val="tx1">
+            <a:lumMod val="5000"/>
+            <a:lumOff val="95000"/>
+          </a:schemeClr>
+        </a:solidFill>
+        <a:round/>
+      </a:ln>
+    </cs:spPr>
+  </cs:gridlineMinor>
+  <cs:hiLoLine>
+    <cs:lnRef idx="0"/>
+    <cs:fillRef idx="0"/>
+    <cs:effectRef idx="0"/>
+    <cs:fontRef idx="minor">
+      <a:schemeClr val="tx1"/>
+    </cs:fontRef>
+    <cs:spPr>
+      <a:ln w="9525" cap="flat" cmpd="sng" algn="ctr">
+        <a:solidFill>
+          <a:schemeClr val="tx1">
+            <a:lumMod val="50000"/>
+            <a:lumOff val="50000"/>
+          </a:schemeClr>
+        </a:solidFill>
+        <a:round/>
+      </a:ln>
+    </cs:spPr>
+  </cs:hiLoLine>
+  <cs:leaderLine>
+    <cs:lnRef idx="0"/>
+    <cs:fillRef idx="0"/>
+    <cs:effectRef idx="0"/>
+    <cs:fontRef idx="minor">
+      <a:schemeClr val="tx1"/>
+    </cs:fontRef>
+    <cs:spPr>
+      <a:ln w="9525" cap="flat" cmpd="sng" algn="ctr">
+        <a:solidFill>
+          <a:schemeClr val="tx1">
+            <a:lumMod val="35000"/>
+            <a:lumOff val="65000"/>
+          </a:schemeClr>
+        </a:solidFill>
+        <a:round/>
+      </a:ln>
+    </cs:spPr>
+  </cs:leaderLine>
+  <cs:legend>
+    <cs:lnRef idx="0"/>
+    <cs:fillRef idx="0"/>
+    <cs:effectRef idx="0"/>
+    <cs:fontRef idx="minor">
+      <a:schemeClr val="tx1">
+        <a:lumMod val="65000"/>
+        <a:lumOff val="35000"/>
+      </a:schemeClr>
+    </cs:fontRef>
+    <cs:defRPr sz="1197" kern="1200"/>
+  </cs:legend>
+  <cs:plotArea mods="allowNoFillOverride allowNoLineOverride">
+    <cs:lnRef idx="0"/>
+    <cs:fillRef idx="0"/>
+    <cs:effectRef idx="0"/>
+    <cs:fontRef idx="minor">
+      <a:schemeClr val="tx1"/>
+    </cs:fontRef>
+  </cs:plotArea>
+  <cs:plotArea3D mods="allowNoFillOverride allowNoLineOverride">
+    <cs:lnRef idx="0"/>
+    <cs:fillRef idx="0"/>
+    <cs:effectRef idx="0"/>
+    <cs:fontRef idx="minor">
+      <a:schemeClr val="tx1"/>
+    </cs:fontRef>
+  </cs:plotArea3D>
+  <cs:seriesAxis>
+    <cs:lnRef idx="0"/>
+    <cs:fillRef idx="0"/>
+    <cs:effectRef idx="0"/>
+    <cs:fontRef idx="minor">
+      <a:schemeClr val="tx1">
+        <a:lumMod val="65000"/>
+        <a:lumOff val="35000"/>
+      </a:schemeClr>
+    </cs:fontRef>
+    <cs:defRPr sz="1197" kern="1200"/>
+  </cs:seriesAxis>
+  <cs:seriesLine>
+    <cs:lnRef idx="0"/>
+    <cs:fillRef idx="0"/>
+    <cs:effectRef idx="0"/>
+    <cs:fontRef idx="minor">
+      <a:schemeClr val="tx1"/>
+    </cs:fontRef>
+    <cs:spPr>
+      <a:ln w="9525" cap="flat" cmpd="sng" algn="ctr">
+        <a:solidFill>
+          <a:schemeClr val="tx1">
+            <a:lumMod val="35000"/>
+            <a:lumOff val="65000"/>
+          </a:schemeClr>
+        </a:solidFill>
+        <a:round/>
+      </a:ln>
+    </cs:spPr>
+  </cs:seriesLine>
+  <cs:title>
+    <cs:lnRef idx="0"/>
+    <cs:fillRef idx="0"/>
+    <cs:effectRef idx="0"/>
+    <cs:fontRef idx="minor">
+      <a:schemeClr val="tx1">
+        <a:lumMod val="65000"/>
+        <a:lumOff val="35000"/>
+      </a:schemeClr>
+    </cs:fontRef>
+    <cs:defRPr sz="1862" b="0" kern="1200" spc="0" baseline="0"/>
+  </cs:title>
+  <cs:trendline>
+    <cs:lnRef idx="0">
+      <cs:styleClr val="auto"/>
+    </cs:lnRef>
+    <cs:fillRef idx="0"/>
+    <cs:effectRef idx="0"/>
+    <cs:fontRef idx="minor">
+      <a:schemeClr val="tx1"/>
+    </cs:fontRef>
+    <cs:spPr>
+      <a:ln w="19050" cap="rnd">
+        <a:solidFill>
+          <a:schemeClr val="phClr"/>
+        </a:solidFill>
+        <a:prstDash val="sysDot"/>
+      </a:ln>
+    </cs:spPr>
+  </cs:trendline>
+  <cs:trendlineLabel>
+    <cs:lnRef idx="0"/>
+    <cs:fillRef idx="0"/>
+    <cs:effectRef idx="0"/>
+    <cs:fontRef idx="minor">
+      <a:schemeClr val="tx1">
+        <a:lumMod val="65000"/>
+        <a:lumOff val="35000"/>
+      </a:schemeClr>
+    </cs:fontRef>
+    <cs:defRPr sz="1197" kern="1200"/>
+  </cs:trendlineLabel>
+  <cs:upBar>
+    <cs:lnRef idx="0"/>
+    <cs:fillRef idx="0"/>
+    <cs:effectRef idx="0"/>
+    <cs:fontRef idx="minor">
+      <a:schemeClr val="tx1"/>
+    </cs:fontRef>
+    <cs:spPr>
+      <a:solidFill>
+        <a:schemeClr val="lt1"/>
+      </a:solidFill>
+      <a:ln w="9525" cap="flat" cmpd="sng" algn="ctr">
+        <a:solidFill>
+          <a:schemeClr val="tx1">
+            <a:lumMod val="65000"/>
+            <a:lumOff val="35000"/>
+          </a:schemeClr>
+        </a:solidFill>
+        <a:round/>
+      </a:ln>
+    </cs:spPr>
+  </cs:upBar>
+  <cs:valueAxis>
+    <cs:lnRef idx="0"/>
+    <cs:fillRef idx="0"/>
+    <cs:effectRef idx="0"/>
+    <cs:fontRef idx="minor">
+      <a:schemeClr val="tx1">
+        <a:lumMod val="65000"/>
+        <a:lumOff val="35000"/>
+      </a:schemeClr>
+    </cs:fontRef>
+    <cs:defRPr sz="1197" kern="1200"/>
+  </cs:valueAxis>
+  <cs:wall>
+    <cs:lnRef idx="0"/>
+    <cs:fillRef idx="0"/>
+    <cs:effectRef idx="0"/>
+    <cs:fontRef idx="minor">
+      <a:schemeClr val="tx1"/>
+    </cs:fontRef>
+    <cs:spPr>
+      <a:noFill/>
+      <a:ln>
+        <a:noFill/>
+      </a:ln>
+    </cs:spPr>
+  </cs:wall>
+</cs:chartStyle>
+</file>
+
 <file path=ppt/notesMasters/notesMaster1.xml><?xml version="1.0" encoding="utf-8"?>
 <p:notesMaster xmlns:a="http://schemas.openxmlformats.org/drawingml/2006/main" xmlns:r="http://schemas.openxmlformats.org/officeDocument/2006/relationships" xmlns:p="http://schemas.openxmlformats.org/presentationml/2006/main">
   <p:cSld>
@@ -5077,6 +5891,92 @@
     <p:extLst>
       <p:ext uri="{BB962C8B-B14F-4D97-AF65-F5344CB8AC3E}">
         <p14:creationId xmlns:p14="http://schemas.microsoft.com/office/powerpoint/2010/main" val="843502301"/>
+      </p:ext>
+    </p:extLst>
+  </p:cSld>
+  <p:clrMapOvr>
+    <a:masterClrMapping/>
+  </p:clrMapOvr>
+</p:sld>
+</file>
+
+<file path=ppt/slides/slide4.xml><?xml version="1.0" encoding="utf-8"?>
+<p:sld xmlns:a="http://schemas.openxmlformats.org/drawingml/2006/main" xmlns:r="http://schemas.openxmlformats.org/officeDocument/2006/relationships" xmlns:p="http://schemas.openxmlformats.org/presentationml/2006/main">
+  <p:cSld>
+    <p:spTree>
+      <p:nvGrpSpPr>
+        <p:cNvPr id="1" name=""/>
+        <p:cNvGrpSpPr/>
+        <p:nvPr/>
+      </p:nvGrpSpPr>
+      <p:grpSpPr>
+        <a:xfrm>
+          <a:off x="0" y="0"/>
+          <a:ext cx="0" cy="0"/>
+          <a:chOff x="0" y="0"/>
+          <a:chExt cx="0" cy="0"/>
+        </a:xfrm>
+      </p:grpSpPr>
+      <p:sp>
+        <p:nvSpPr>
+          <p:cNvPr id="2" name="Title 1">
+            <a:extLst>
+              <a:ext uri="{FF2B5EF4-FFF2-40B4-BE49-F238E27FC236}">
+                <a16:creationId xmlns:a16="http://schemas.microsoft.com/office/drawing/2014/main" id="{7F5459C8-7392-4F49-B900-79B80EEB4864}"/>
+              </a:ext>
+            </a:extLst>
+          </p:cNvPr>
+          <p:cNvSpPr>
+            <a:spLocks noGrp="1"/>
+          </p:cNvSpPr>
+          <p:nvPr>
+            <p:ph type="title"/>
+          </p:nvPr>
+        </p:nvSpPr>
+        <p:spPr/>
+        <p:txBody>
+          <a:bodyPr/>
+          <a:lstStyle/>
+          <a:p>
+            <a:r>
+              <a:rPr lang="en-GB" dirty="0"/>
+              <a:t>Slide 4</a:t>
+            </a:r>
+          </a:p>
+        </p:txBody>
+      </p:sp>
+      <p:graphicFrame>
+        <p:nvGraphicFramePr>
+          <p:cNvPr id="6" name="Chart 5">
+            <a:extLst>
+              <a:ext uri="{FF2B5EF4-FFF2-40B4-BE49-F238E27FC236}">
+                <a16:creationId xmlns:a16="http://schemas.microsoft.com/office/drawing/2014/main" id="{BD0C03A6-3BB1-4507-BB17-7DD76CC22D8C}"/>
+              </a:ext>
+            </a:extLst>
+          </p:cNvPr>
+          <p:cNvGraphicFramePr/>
+          <p:nvPr>
+            <p:extLst>
+              <p:ext uri="{D42A27DB-BD31-4B8C-83A1-F6EECF244321}">
+                <p14:modId xmlns:p14="http://schemas.microsoft.com/office/powerpoint/2010/main" val="1672296932"/>
+              </p:ext>
+            </p:extLst>
+          </p:nvPr>
+        </p:nvGraphicFramePr>
+        <p:xfrm>
+          <a:off x="2032000" y="719666"/>
+          <a:ext cx="8128000" cy="5418667"/>
+        </p:xfrm>
+        <a:graphic>
+          <a:graphicData uri="http://schemas.openxmlformats.org/drawingml/2006/chart">
+            <c:chart xmlns:c="http://schemas.openxmlformats.org/drawingml/2006/chart" xmlns:r="http://schemas.openxmlformats.org/officeDocument/2006/relationships" r:id="rId2"/>
+          </a:graphicData>
+        </a:graphic>
+      </p:graphicFrame>
+    </p:spTree>
+    <p:extLst>
+      <p:ext uri="{BB962C8B-B14F-4D97-AF65-F5344CB8AC3E}">
+        <p14:creationId xmlns:p14="http://schemas.microsoft.com/office/powerpoint/2010/main" val="2883765332"/>
       </p:ext>
     </p:extLst>
   </p:cSld>

</xml_diff>

<commit_message>
Added the ability to find tables and change text contents
</commit_message>
<xml_diff>
--- a/PowerPointEditorLib.Tests/ppt-examples/test.pptx
+++ b/PowerPointEditorLib.Tests/ppt-examples/test.pptx
@@ -5,13 +5,14 @@
     <p:sldMasterId id="2147483648" r:id="rId1"/>
   </p:sldMasterIdLst>
   <p:notesMasterIdLst>
-    <p:notesMasterId r:id="rId6"/>
+    <p:notesMasterId r:id="rId7"/>
   </p:notesMasterIdLst>
   <p:sldIdLst>
     <p:sldId id="256" r:id="rId2"/>
     <p:sldId id="257" r:id="rId3"/>
     <p:sldId id="258" r:id="rId4"/>
     <p:sldId id="259" r:id="rId5"/>
+    <p:sldId id="260" r:id="rId6"/>
   </p:sldIdLst>
   <p:sldSz cx="12192000" cy="6858000"/>
   <p:notesSz cx="6858000" cy="9144000"/>
@@ -652,6 +653,11 @@
               </a:ln>
               <a:effectLst/>
             </c:spPr>
+            <c:extLst>
+              <c:ext xmlns:c16="http://schemas.microsoft.com/office/drawing/2014/chart" uri="{C3380CC4-5D6E-409C-BE32-E72D297353CC}">
+                <c16:uniqueId val="{00000001-9ED3-426F-B116-08546E301750}"/>
+              </c:ext>
+            </c:extLst>
           </c:dPt>
           <c:dPt>
             <c:idx val="1"/>
@@ -667,6 +673,11 @@
               </a:ln>
               <a:effectLst/>
             </c:spPr>
+            <c:extLst>
+              <c:ext xmlns:c16="http://schemas.microsoft.com/office/drawing/2014/chart" uri="{C3380CC4-5D6E-409C-BE32-E72D297353CC}">
+                <c16:uniqueId val="{00000003-9ED3-426F-B116-08546E301750}"/>
+              </c:ext>
+            </c:extLst>
           </c:dPt>
           <c:dPt>
             <c:idx val="2"/>
@@ -682,6 +693,11 @@
               </a:ln>
               <a:effectLst/>
             </c:spPr>
+            <c:extLst>
+              <c:ext xmlns:c16="http://schemas.microsoft.com/office/drawing/2014/chart" uri="{C3380CC4-5D6E-409C-BE32-E72D297353CC}">
+                <c16:uniqueId val="{00000005-9ED3-426F-B116-08546E301750}"/>
+              </c:ext>
+            </c:extLst>
           </c:dPt>
           <c:dPt>
             <c:idx val="3"/>
@@ -697,6 +713,11 @@
               </a:ln>
               <a:effectLst/>
             </c:spPr>
+            <c:extLst>
+              <c:ext xmlns:c16="http://schemas.microsoft.com/office/drawing/2014/chart" uri="{C3380CC4-5D6E-409C-BE32-E72D297353CC}">
+                <c16:uniqueId val="{00000007-9ED3-426F-B116-08546E301750}"/>
+              </c:ext>
+            </c:extLst>
           </c:dPt>
           <c:cat>
             <c:strRef>
@@ -2013,7 +2034,7 @@
           <a:p>
             <a:fld id="{F72DBBF0-3CD8-4197-8DE9-31F892749D5F}" type="datetimeFigureOut">
               <a:rPr lang="en-GB" smtClean="0"/>
-              <a:t>05/04/2022</a:t>
+              <a:t>06/05/2022</a:t>
             </a:fld>
             <a:endParaRPr lang="en-GB"/>
           </a:p>
@@ -2526,7 +2547,7 @@
           <a:p>
             <a:fld id="{61FD400D-99EE-4D14-892C-72662AB4C03C}" type="datetimeFigureOut">
               <a:rPr lang="en-GB" smtClean="0"/>
-              <a:t>05/04/2022</a:t>
+              <a:t>06/05/2022</a:t>
             </a:fld>
             <a:endParaRPr lang="en-GB"/>
           </a:p>
@@ -2726,7 +2747,7 @@
           <a:p>
             <a:fld id="{61FD400D-99EE-4D14-892C-72662AB4C03C}" type="datetimeFigureOut">
               <a:rPr lang="en-GB" smtClean="0"/>
-              <a:t>05/04/2022</a:t>
+              <a:t>06/05/2022</a:t>
             </a:fld>
             <a:endParaRPr lang="en-GB"/>
           </a:p>
@@ -2936,7 +2957,7 @@
           <a:p>
             <a:fld id="{61FD400D-99EE-4D14-892C-72662AB4C03C}" type="datetimeFigureOut">
               <a:rPr lang="en-GB" smtClean="0"/>
-              <a:t>05/04/2022</a:t>
+              <a:t>06/05/2022</a:t>
             </a:fld>
             <a:endParaRPr lang="en-GB"/>
           </a:p>
@@ -3136,7 +3157,7 @@
           <a:p>
             <a:fld id="{61FD400D-99EE-4D14-892C-72662AB4C03C}" type="datetimeFigureOut">
               <a:rPr lang="en-GB" smtClean="0"/>
-              <a:t>05/04/2022</a:t>
+              <a:t>06/05/2022</a:t>
             </a:fld>
             <a:endParaRPr lang="en-GB"/>
           </a:p>
@@ -3412,7 +3433,7 @@
           <a:p>
             <a:fld id="{61FD400D-99EE-4D14-892C-72662AB4C03C}" type="datetimeFigureOut">
               <a:rPr lang="en-GB" smtClean="0"/>
-              <a:t>05/04/2022</a:t>
+              <a:t>06/05/2022</a:t>
             </a:fld>
             <a:endParaRPr lang="en-GB"/>
           </a:p>
@@ -3680,7 +3701,7 @@
           <a:p>
             <a:fld id="{61FD400D-99EE-4D14-892C-72662AB4C03C}" type="datetimeFigureOut">
               <a:rPr lang="en-GB" smtClean="0"/>
-              <a:t>05/04/2022</a:t>
+              <a:t>06/05/2022</a:t>
             </a:fld>
             <a:endParaRPr lang="en-GB"/>
           </a:p>
@@ -4095,7 +4116,7 @@
           <a:p>
             <a:fld id="{61FD400D-99EE-4D14-892C-72662AB4C03C}" type="datetimeFigureOut">
               <a:rPr lang="en-GB" smtClean="0"/>
-              <a:t>05/04/2022</a:t>
+              <a:t>06/05/2022</a:t>
             </a:fld>
             <a:endParaRPr lang="en-GB"/>
           </a:p>
@@ -4237,7 +4258,7 @@
           <a:p>
             <a:fld id="{61FD400D-99EE-4D14-892C-72662AB4C03C}" type="datetimeFigureOut">
               <a:rPr lang="en-GB" smtClean="0"/>
-              <a:t>05/04/2022</a:t>
+              <a:t>06/05/2022</a:t>
             </a:fld>
             <a:endParaRPr lang="en-GB"/>
           </a:p>
@@ -4350,7 +4371,7 @@
           <a:p>
             <a:fld id="{61FD400D-99EE-4D14-892C-72662AB4C03C}" type="datetimeFigureOut">
               <a:rPr lang="en-GB" smtClean="0"/>
-              <a:t>05/04/2022</a:t>
+              <a:t>06/05/2022</a:t>
             </a:fld>
             <a:endParaRPr lang="en-GB"/>
           </a:p>
@@ -4663,7 +4684,7 @@
           <a:p>
             <a:fld id="{61FD400D-99EE-4D14-892C-72662AB4C03C}" type="datetimeFigureOut">
               <a:rPr lang="en-GB" smtClean="0"/>
-              <a:t>05/04/2022</a:t>
+              <a:t>06/05/2022</a:t>
             </a:fld>
             <a:endParaRPr lang="en-GB"/>
           </a:p>
@@ -4952,7 +4973,7 @@
           <a:p>
             <a:fld id="{61FD400D-99EE-4D14-892C-72662AB4C03C}" type="datetimeFigureOut">
               <a:rPr lang="en-GB" smtClean="0"/>
-              <a:t>05/04/2022</a:t>
+              <a:t>06/05/2022</a:t>
             </a:fld>
             <a:endParaRPr lang="en-GB"/>
           </a:p>
@@ -5195,7 +5216,7 @@
           <a:p>
             <a:fld id="{61FD400D-99EE-4D14-892C-72662AB4C03C}" type="datetimeFigureOut">
               <a:rPr lang="en-GB" smtClean="0"/>
-              <a:t>05/04/2022</a:t>
+              <a:t>06/05/2022</a:t>
             </a:fld>
             <a:endParaRPr lang="en-GB"/>
           </a:p>
@@ -5977,6 +5998,693 @@
     <p:extLst>
       <p:ext uri="{BB962C8B-B14F-4D97-AF65-F5344CB8AC3E}">
         <p14:creationId xmlns:p14="http://schemas.microsoft.com/office/powerpoint/2010/main" val="2883765332"/>
+      </p:ext>
+    </p:extLst>
+  </p:cSld>
+  <p:clrMapOvr>
+    <a:masterClrMapping/>
+  </p:clrMapOvr>
+</p:sld>
+</file>
+
+<file path=ppt/slides/slide5.xml><?xml version="1.0" encoding="utf-8"?>
+<p:sld xmlns:a="http://schemas.openxmlformats.org/drawingml/2006/main" xmlns:r="http://schemas.openxmlformats.org/officeDocument/2006/relationships" xmlns:p="http://schemas.openxmlformats.org/presentationml/2006/main">
+  <p:cSld>
+    <p:spTree>
+      <p:nvGrpSpPr>
+        <p:cNvPr id="1" name=""/>
+        <p:cNvGrpSpPr/>
+        <p:nvPr/>
+      </p:nvGrpSpPr>
+      <p:grpSpPr>
+        <a:xfrm>
+          <a:off x="0" y="0"/>
+          <a:ext cx="0" cy="0"/>
+          <a:chOff x="0" y="0"/>
+          <a:chExt cx="0" cy="0"/>
+        </a:xfrm>
+      </p:grpSpPr>
+      <p:graphicFrame>
+        <p:nvGraphicFramePr>
+          <p:cNvPr id="4" name="Table 3">
+            <a:extLst>
+              <a:ext uri="{FF2B5EF4-FFF2-40B4-BE49-F238E27FC236}">
+                <a16:creationId xmlns:a16="http://schemas.microsoft.com/office/drawing/2014/main" id="{EDA227C8-AF25-9A4D-1A22-5E2FCB009768}"/>
+              </a:ext>
+            </a:extLst>
+          </p:cNvPr>
+          <p:cNvGraphicFramePr>
+            <a:graphicFrameLocks noGrp="1"/>
+          </p:cNvGraphicFramePr>
+          <p:nvPr>
+            <p:extLst>
+              <p:ext uri="{D42A27DB-BD31-4B8C-83A1-F6EECF244321}">
+                <p14:modId xmlns:p14="http://schemas.microsoft.com/office/powerpoint/2010/main" val="4187777551"/>
+              </p:ext>
+            </p:extLst>
+          </p:nvPr>
+        </p:nvGraphicFramePr>
+        <p:xfrm>
+          <a:off x="3000561" y="1953358"/>
+          <a:ext cx="5770024" cy="1798320"/>
+        </p:xfrm>
+        <a:graphic>
+          <a:graphicData uri="http://schemas.openxmlformats.org/drawingml/2006/table">
+            <a:tbl>
+              <a:tblPr firstRow="1" bandRow="1">
+                <a:tableStyleId>{5C22544A-7EE6-4342-B048-85BDC9FD1C3A}</a:tableStyleId>
+              </a:tblPr>
+              <a:tblGrid>
+                <a:gridCol w="1442506">
+                  <a:extLst>
+                    <a:ext uri="{9D8B030D-6E8A-4147-A177-3AD203B41FA5}">
+                      <a16:colId xmlns:a16="http://schemas.microsoft.com/office/drawing/2014/main" val="369574053"/>
+                    </a:ext>
+                  </a:extLst>
+                </a:gridCol>
+                <a:gridCol w="1442506">
+                  <a:extLst>
+                    <a:ext uri="{9D8B030D-6E8A-4147-A177-3AD203B41FA5}">
+                      <a16:colId xmlns:a16="http://schemas.microsoft.com/office/drawing/2014/main" val="3539919620"/>
+                    </a:ext>
+                  </a:extLst>
+                </a:gridCol>
+                <a:gridCol w="1442506">
+                  <a:extLst>
+                    <a:ext uri="{9D8B030D-6E8A-4147-A177-3AD203B41FA5}">
+                      <a16:colId xmlns:a16="http://schemas.microsoft.com/office/drawing/2014/main" val="4045529518"/>
+                    </a:ext>
+                  </a:extLst>
+                </a:gridCol>
+                <a:gridCol w="1442506">
+                  <a:extLst>
+                    <a:ext uri="{9D8B030D-6E8A-4147-A177-3AD203B41FA5}">
+                      <a16:colId xmlns:a16="http://schemas.microsoft.com/office/drawing/2014/main" val="3818636448"/>
+                    </a:ext>
+                  </a:extLst>
+                </a:gridCol>
+              </a:tblGrid>
+              <a:tr h="150476">
+                <a:tc>
+                  <a:txBody>
+                    <a:bodyPr/>
+                    <a:lstStyle/>
+                    <a:p>
+                      <a:r>
+                        <a:rPr lang="en-GB" sz="1200">
+                          <a:latin typeface="Polaris Medium" panose="02000000000000000000" pitchFamily="50" charset="0"/>
+                          <a:ea typeface="Polaris Medium" panose="02000000000000000000" pitchFamily="50" charset="0"/>
+                          <a:cs typeface="Polaris Medium" panose="02000000000000000000" pitchFamily="50" charset="0"/>
+                        </a:rPr>
+                        <a:t>Race</a:t>
+                      </a:r>
+                    </a:p>
+                  </a:txBody>
+                  <a:tcPr>
+                    <a:solidFill>
+                      <a:srgbClr val="14B7ED"/>
+                    </a:solidFill>
+                  </a:tcPr>
+                </a:tc>
+                <a:tc>
+                  <a:txBody>
+                    <a:bodyPr/>
+                    <a:lstStyle/>
+                    <a:p>
+                      <a:r>
+                        <a:rPr lang="en-GB" sz="1200">
+                          <a:latin typeface="Polaris Medium" panose="02000000000000000000" pitchFamily="50" charset="0"/>
+                          <a:ea typeface="Polaris Medium" panose="02000000000000000000" pitchFamily="50" charset="0"/>
+                          <a:cs typeface="Polaris Medium" panose="02000000000000000000" pitchFamily="50" charset="0"/>
+                        </a:rPr>
+                        <a:t>Free-to-air</a:t>
+                      </a:r>
+                    </a:p>
+                  </a:txBody>
+                  <a:tcPr>
+                    <a:solidFill>
+                      <a:srgbClr val="14B7ED"/>
+                    </a:solidFill>
+                  </a:tcPr>
+                </a:tc>
+                <a:tc>
+                  <a:txBody>
+                    <a:bodyPr/>
+                    <a:lstStyle/>
+                    <a:p>
+                      <a:r>
+                        <a:rPr lang="en-GB" sz="1200">
+                          <a:latin typeface="Polaris Medium" panose="02000000000000000000" pitchFamily="50" charset="0"/>
+                          <a:ea typeface="Polaris Medium" panose="02000000000000000000" pitchFamily="50" charset="0"/>
+                          <a:cs typeface="Polaris Medium" panose="02000000000000000000" pitchFamily="50" charset="0"/>
+                        </a:rPr>
+                        <a:t>Pay TV</a:t>
+                      </a:r>
+                    </a:p>
+                  </a:txBody>
+                  <a:tcPr>
+                    <a:solidFill>
+                      <a:srgbClr val="14B7ED"/>
+                    </a:solidFill>
+                  </a:tcPr>
+                </a:tc>
+                <a:tc>
+                  <a:txBody>
+                    <a:bodyPr/>
+                    <a:lstStyle/>
+                    <a:p>
+                      <a:r>
+                        <a:rPr lang="en-GB" sz="1200">
+                          <a:latin typeface="Polaris Medium" panose="02000000000000000000" pitchFamily="50" charset="0"/>
+                          <a:ea typeface="Polaris Medium" panose="02000000000000000000" pitchFamily="50" charset="0"/>
+                          <a:cs typeface="Polaris Medium" panose="02000000000000000000" pitchFamily="50" charset="0"/>
+                        </a:rPr>
+                        <a:t>Digital*</a:t>
+                      </a:r>
+                    </a:p>
+                  </a:txBody>
+                  <a:tcPr>
+                    <a:solidFill>
+                      <a:srgbClr val="14B7ED"/>
+                    </a:solidFill>
+                  </a:tcPr>
+                </a:tc>
+                <a:extLst>
+                  <a:ext uri="{0D108BD9-81ED-4DB2-BD59-A6C34878D82A}">
+                    <a16:rowId xmlns:a16="http://schemas.microsoft.com/office/drawing/2014/main" val="2579545381"/>
+                  </a:ext>
+                </a:extLst>
+              </a:tr>
+              <a:tr h="188095">
+                <a:tc>
+                  <a:txBody>
+                    <a:bodyPr/>
+                    <a:lstStyle/>
+                    <a:p>
+                      <a:r>
+                        <a:rPr lang="en-GB" sz="1200">
+                          <a:solidFill>
+                            <a:srgbClr val="8E8F8F"/>
+                          </a:solidFill>
+                          <a:latin typeface="Polaris Medium" panose="02000000000000000000" pitchFamily="50" charset="0"/>
+                          <a:ea typeface="Polaris Medium" panose="02000000000000000000" pitchFamily="50" charset="0"/>
+                          <a:cs typeface="Polaris Medium" panose="02000000000000000000" pitchFamily="50" charset="0"/>
+                        </a:rPr>
+                        <a:t>S7 Puebla R8</a:t>
+                      </a:r>
+                    </a:p>
+                  </a:txBody>
+                  <a:tcPr>
+                    <a:solidFill>
+                      <a:srgbClr val="EFEFF0"/>
+                    </a:solidFill>
+                  </a:tcPr>
+                </a:tc>
+                <a:tc>
+                  <a:txBody>
+                    <a:bodyPr/>
+                    <a:lstStyle/>
+                    <a:p>
+                      <a:endParaRPr lang="en-GB" sz="1400">
+                        <a:solidFill>
+                          <a:srgbClr val="8E8F8F"/>
+                        </a:solidFill>
+                        <a:latin typeface="Polaris Medium" panose="02000000000000000000" pitchFamily="50" charset="0"/>
+                        <a:ea typeface="Polaris Medium" panose="02000000000000000000" pitchFamily="50" charset="0"/>
+                        <a:cs typeface="Polaris Medium" panose="02000000000000000000" pitchFamily="50" charset="0"/>
+                      </a:endParaRPr>
+                    </a:p>
+                  </a:txBody>
+                  <a:tcPr>
+                    <a:solidFill>
+                      <a:srgbClr val="EFEFF0"/>
+                    </a:solidFill>
+                  </a:tcPr>
+                </a:tc>
+                <a:tc>
+                  <a:txBody>
+                    <a:bodyPr/>
+                    <a:lstStyle/>
+                    <a:p>
+                      <a:endParaRPr lang="en-GB" sz="1400">
+                        <a:solidFill>
+                          <a:srgbClr val="8E8F8F"/>
+                        </a:solidFill>
+                        <a:latin typeface="Polaris Medium" panose="02000000000000000000" pitchFamily="50" charset="0"/>
+                        <a:ea typeface="Polaris Medium" panose="02000000000000000000" pitchFamily="50" charset="0"/>
+                        <a:cs typeface="Polaris Medium" panose="02000000000000000000" pitchFamily="50" charset="0"/>
+                      </a:endParaRPr>
+                    </a:p>
+                  </a:txBody>
+                  <a:tcPr>
+                    <a:solidFill>
+                      <a:srgbClr val="EFEFF0"/>
+                    </a:solidFill>
+                  </a:tcPr>
+                </a:tc>
+                <a:tc>
+                  <a:txBody>
+                    <a:bodyPr/>
+                    <a:lstStyle/>
+                    <a:p>
+                      <a:endParaRPr lang="en-GB" sz="1400">
+                        <a:solidFill>
+                          <a:srgbClr val="8E8F8F"/>
+                        </a:solidFill>
+                        <a:latin typeface="Polaris Medium" panose="02000000000000000000" pitchFamily="50" charset="0"/>
+                        <a:ea typeface="Polaris Medium" panose="02000000000000000000" pitchFamily="50" charset="0"/>
+                        <a:cs typeface="Polaris Medium" panose="02000000000000000000" pitchFamily="50" charset="0"/>
+                      </a:endParaRPr>
+                    </a:p>
+                  </a:txBody>
+                  <a:tcPr>
+                    <a:solidFill>
+                      <a:srgbClr val="EFEFF0"/>
+                    </a:solidFill>
+                  </a:tcPr>
+                </a:tc>
+                <a:extLst>
+                  <a:ext uri="{0D108BD9-81ED-4DB2-BD59-A6C34878D82A}">
+                    <a16:rowId xmlns:a16="http://schemas.microsoft.com/office/drawing/2014/main" val="4256379711"/>
+                  </a:ext>
+                </a:extLst>
+              </a:tr>
+              <a:tr h="188095">
+                <a:tc>
+                  <a:txBody>
+                    <a:bodyPr/>
+                    <a:lstStyle/>
+                    <a:p>
+                      <a:r>
+                        <a:rPr lang="en-GB" sz="1200">
+                          <a:solidFill>
+                            <a:srgbClr val="8E8F8F"/>
+                          </a:solidFill>
+                          <a:latin typeface="Polaris Medium" panose="02000000000000000000" pitchFamily="50" charset="0"/>
+                          <a:ea typeface="Polaris Medium" panose="02000000000000000000" pitchFamily="50" charset="0"/>
+                          <a:cs typeface="Polaris Medium" panose="02000000000000000000" pitchFamily="50" charset="0"/>
+                        </a:rPr>
+                        <a:t>S7 Puebla R9</a:t>
+                      </a:r>
+                    </a:p>
+                  </a:txBody>
+                  <a:tcPr>
+                    <a:solidFill>
+                      <a:srgbClr val="EFEFF0"/>
+                    </a:solidFill>
+                  </a:tcPr>
+                </a:tc>
+                <a:tc>
+                  <a:txBody>
+                    <a:bodyPr/>
+                    <a:lstStyle/>
+                    <a:p>
+                      <a:endParaRPr lang="en-GB" sz="1400">
+                        <a:solidFill>
+                          <a:srgbClr val="8E8F8F"/>
+                        </a:solidFill>
+                        <a:latin typeface="Polaris Medium" panose="02000000000000000000" pitchFamily="50" charset="0"/>
+                        <a:ea typeface="Polaris Medium" panose="02000000000000000000" pitchFamily="50" charset="0"/>
+                        <a:cs typeface="Polaris Medium" panose="02000000000000000000" pitchFamily="50" charset="0"/>
+                      </a:endParaRPr>
+                    </a:p>
+                  </a:txBody>
+                  <a:tcPr>
+                    <a:solidFill>
+                      <a:srgbClr val="EFEFF0"/>
+                    </a:solidFill>
+                  </a:tcPr>
+                </a:tc>
+                <a:tc>
+                  <a:txBody>
+                    <a:bodyPr/>
+                    <a:lstStyle/>
+                    <a:p>
+                      <a:endParaRPr lang="en-GB" sz="1400">
+                        <a:solidFill>
+                          <a:srgbClr val="8E8F8F"/>
+                        </a:solidFill>
+                        <a:latin typeface="Polaris Medium" panose="02000000000000000000" pitchFamily="50" charset="0"/>
+                        <a:ea typeface="Polaris Medium" panose="02000000000000000000" pitchFamily="50" charset="0"/>
+                        <a:cs typeface="Polaris Medium" panose="02000000000000000000" pitchFamily="50" charset="0"/>
+                      </a:endParaRPr>
+                    </a:p>
+                  </a:txBody>
+                  <a:tcPr>
+                    <a:solidFill>
+                      <a:srgbClr val="EFEFF0"/>
+                    </a:solidFill>
+                  </a:tcPr>
+                </a:tc>
+                <a:tc>
+                  <a:txBody>
+                    <a:bodyPr/>
+                    <a:lstStyle/>
+                    <a:p>
+                      <a:endParaRPr lang="en-GB" sz="1400">
+                        <a:solidFill>
+                          <a:srgbClr val="8E8F8F"/>
+                        </a:solidFill>
+                        <a:latin typeface="Polaris Medium" panose="02000000000000000000" pitchFamily="50" charset="0"/>
+                        <a:ea typeface="Polaris Medium" panose="02000000000000000000" pitchFamily="50" charset="0"/>
+                        <a:cs typeface="Polaris Medium" panose="02000000000000000000" pitchFamily="50" charset="0"/>
+                      </a:endParaRPr>
+                    </a:p>
+                  </a:txBody>
+                  <a:tcPr>
+                    <a:solidFill>
+                      <a:srgbClr val="EFEFF0"/>
+                    </a:solidFill>
+                  </a:tcPr>
+                </a:tc>
+                <a:extLst>
+                  <a:ext uri="{0D108BD9-81ED-4DB2-BD59-A6C34878D82A}">
+                    <a16:rowId xmlns:a16="http://schemas.microsoft.com/office/drawing/2014/main" val="4145247526"/>
+                  </a:ext>
+                </a:extLst>
+              </a:tr>
+              <a:tr h="188095">
+                <a:tc>
+                  <a:txBody>
+                    <a:bodyPr/>
+                    <a:lstStyle/>
+                    <a:p>
+                      <a:r>
+                        <a:rPr lang="en-GB" sz="1200">
+                          <a:solidFill>
+                            <a:srgbClr val="8E8F8F"/>
+                          </a:solidFill>
+                          <a:latin typeface="Polaris Medium" panose="02000000000000000000" pitchFamily="50" charset="0"/>
+                          <a:ea typeface="Polaris Medium" panose="02000000000000000000" pitchFamily="50" charset="0"/>
+                          <a:cs typeface="Polaris Medium" panose="02000000000000000000" pitchFamily="50" charset="0"/>
+                        </a:rPr>
+                        <a:t>S8 </a:t>
+                      </a:r>
+                      <a:r>
+                        <a:rPr lang="en-GB" sz="1200" err="1">
+                          <a:solidFill>
+                            <a:srgbClr val="8E8F8F"/>
+                          </a:solidFill>
+                          <a:latin typeface="Polaris Medium" panose="02000000000000000000" pitchFamily="50" charset="0"/>
+                          <a:ea typeface="Polaris Medium" panose="02000000000000000000" pitchFamily="50" charset="0"/>
+                          <a:cs typeface="Polaris Medium" panose="02000000000000000000" pitchFamily="50" charset="0"/>
+                        </a:rPr>
+                        <a:t>Diriyah</a:t>
+                      </a:r>
+                      <a:r>
+                        <a:rPr lang="en-GB" sz="1200">
+                          <a:solidFill>
+                            <a:srgbClr val="8E8F8F"/>
+                          </a:solidFill>
+                          <a:latin typeface="Polaris Medium" panose="02000000000000000000" pitchFamily="50" charset="0"/>
+                          <a:ea typeface="Polaris Medium" panose="02000000000000000000" pitchFamily="50" charset="0"/>
+                          <a:cs typeface="Polaris Medium" panose="02000000000000000000" pitchFamily="50" charset="0"/>
+                        </a:rPr>
+                        <a:t> R1</a:t>
+                      </a:r>
+                    </a:p>
+                  </a:txBody>
+                  <a:tcPr>
+                    <a:solidFill>
+                      <a:srgbClr val="EFEFF0"/>
+                    </a:solidFill>
+                  </a:tcPr>
+                </a:tc>
+                <a:tc>
+                  <a:txBody>
+                    <a:bodyPr/>
+                    <a:lstStyle/>
+                    <a:p>
+                      <a:endParaRPr lang="en-GB" sz="1400">
+                        <a:solidFill>
+                          <a:srgbClr val="8E8F8F"/>
+                        </a:solidFill>
+                        <a:latin typeface="Polaris Medium" panose="02000000000000000000" pitchFamily="50" charset="0"/>
+                        <a:ea typeface="Polaris Medium" panose="02000000000000000000" pitchFamily="50" charset="0"/>
+                        <a:cs typeface="Polaris Medium" panose="02000000000000000000" pitchFamily="50" charset="0"/>
+                      </a:endParaRPr>
+                    </a:p>
+                  </a:txBody>
+                  <a:tcPr>
+                    <a:solidFill>
+                      <a:srgbClr val="EFEFF0"/>
+                    </a:solidFill>
+                  </a:tcPr>
+                </a:tc>
+                <a:tc>
+                  <a:txBody>
+                    <a:bodyPr/>
+                    <a:lstStyle/>
+                    <a:p>
+                      <a:endParaRPr lang="en-GB" sz="1400">
+                        <a:solidFill>
+                          <a:srgbClr val="8E8F8F"/>
+                        </a:solidFill>
+                        <a:latin typeface="Polaris Medium" panose="02000000000000000000" pitchFamily="50" charset="0"/>
+                        <a:ea typeface="Polaris Medium" panose="02000000000000000000" pitchFamily="50" charset="0"/>
+                        <a:cs typeface="Polaris Medium" panose="02000000000000000000" pitchFamily="50" charset="0"/>
+                      </a:endParaRPr>
+                    </a:p>
+                  </a:txBody>
+                  <a:tcPr>
+                    <a:solidFill>
+                      <a:srgbClr val="EFEFF0"/>
+                    </a:solidFill>
+                  </a:tcPr>
+                </a:tc>
+                <a:tc>
+                  <a:txBody>
+                    <a:bodyPr/>
+                    <a:lstStyle/>
+                    <a:p>
+                      <a:endParaRPr lang="en-GB" sz="1400">
+                        <a:solidFill>
+                          <a:srgbClr val="8E8F8F"/>
+                        </a:solidFill>
+                        <a:latin typeface="Polaris Medium" panose="02000000000000000000" pitchFamily="50" charset="0"/>
+                        <a:ea typeface="Polaris Medium" panose="02000000000000000000" pitchFamily="50" charset="0"/>
+                        <a:cs typeface="Polaris Medium" panose="02000000000000000000" pitchFamily="50" charset="0"/>
+                      </a:endParaRPr>
+                    </a:p>
+                  </a:txBody>
+                  <a:tcPr>
+                    <a:solidFill>
+                      <a:srgbClr val="EFEFF0"/>
+                    </a:solidFill>
+                  </a:tcPr>
+                </a:tc>
+                <a:extLst>
+                  <a:ext uri="{0D108BD9-81ED-4DB2-BD59-A6C34878D82A}">
+                    <a16:rowId xmlns:a16="http://schemas.microsoft.com/office/drawing/2014/main" val="1805223326"/>
+                  </a:ext>
+                </a:extLst>
+              </a:tr>
+              <a:tr h="188095">
+                <a:tc>
+                  <a:txBody>
+                    <a:bodyPr/>
+                    <a:lstStyle/>
+                    <a:p>
+                      <a:r>
+                        <a:rPr lang="en-GB" sz="1200">
+                          <a:solidFill>
+                            <a:srgbClr val="8E8F8F"/>
+                          </a:solidFill>
+                          <a:latin typeface="Polaris Medium" panose="02000000000000000000" pitchFamily="50" charset="0"/>
+                          <a:ea typeface="Polaris Medium" panose="02000000000000000000" pitchFamily="50" charset="0"/>
+                          <a:cs typeface="Polaris Medium" panose="02000000000000000000" pitchFamily="50" charset="0"/>
+                        </a:rPr>
+                        <a:t>S8 </a:t>
+                      </a:r>
+                      <a:r>
+                        <a:rPr lang="en-GB" sz="1200" err="1">
+                          <a:solidFill>
+                            <a:srgbClr val="8E8F8F"/>
+                          </a:solidFill>
+                          <a:latin typeface="Polaris Medium" panose="02000000000000000000" pitchFamily="50" charset="0"/>
+                          <a:ea typeface="Polaris Medium" panose="02000000000000000000" pitchFamily="50" charset="0"/>
+                          <a:cs typeface="Polaris Medium" panose="02000000000000000000" pitchFamily="50" charset="0"/>
+                        </a:rPr>
+                        <a:t>Diriyah</a:t>
+                      </a:r>
+                      <a:r>
+                        <a:rPr lang="en-GB" sz="1200">
+                          <a:solidFill>
+                            <a:srgbClr val="8E8F8F"/>
+                          </a:solidFill>
+                          <a:latin typeface="Polaris Medium" panose="02000000000000000000" pitchFamily="50" charset="0"/>
+                          <a:ea typeface="Polaris Medium" panose="02000000000000000000" pitchFamily="50" charset="0"/>
+                          <a:cs typeface="Polaris Medium" panose="02000000000000000000" pitchFamily="50" charset="0"/>
+                        </a:rPr>
+                        <a:t> R2</a:t>
+                      </a:r>
+                    </a:p>
+                  </a:txBody>
+                  <a:tcPr>
+                    <a:solidFill>
+                      <a:srgbClr val="EFEFF0"/>
+                    </a:solidFill>
+                  </a:tcPr>
+                </a:tc>
+                <a:tc>
+                  <a:txBody>
+                    <a:bodyPr/>
+                    <a:lstStyle/>
+                    <a:p>
+                      <a:endParaRPr lang="en-GB" sz="1400">
+                        <a:solidFill>
+                          <a:srgbClr val="8E8F8F"/>
+                        </a:solidFill>
+                        <a:latin typeface="Polaris Medium" panose="02000000000000000000" pitchFamily="50" charset="0"/>
+                        <a:ea typeface="Polaris Medium" panose="02000000000000000000" pitchFamily="50" charset="0"/>
+                        <a:cs typeface="Polaris Medium" panose="02000000000000000000" pitchFamily="50" charset="0"/>
+                      </a:endParaRPr>
+                    </a:p>
+                  </a:txBody>
+                  <a:tcPr>
+                    <a:solidFill>
+                      <a:srgbClr val="EFEFF0"/>
+                    </a:solidFill>
+                  </a:tcPr>
+                </a:tc>
+                <a:tc>
+                  <a:txBody>
+                    <a:bodyPr/>
+                    <a:lstStyle/>
+                    <a:p>
+                      <a:endParaRPr lang="en-GB" sz="1400">
+                        <a:solidFill>
+                          <a:srgbClr val="8E8F8F"/>
+                        </a:solidFill>
+                        <a:latin typeface="Polaris Medium" panose="02000000000000000000" pitchFamily="50" charset="0"/>
+                        <a:ea typeface="Polaris Medium" panose="02000000000000000000" pitchFamily="50" charset="0"/>
+                        <a:cs typeface="Polaris Medium" panose="02000000000000000000" pitchFamily="50" charset="0"/>
+                      </a:endParaRPr>
+                    </a:p>
+                  </a:txBody>
+                  <a:tcPr>
+                    <a:solidFill>
+                      <a:srgbClr val="EFEFF0"/>
+                    </a:solidFill>
+                  </a:tcPr>
+                </a:tc>
+                <a:tc>
+                  <a:txBody>
+                    <a:bodyPr/>
+                    <a:lstStyle/>
+                    <a:p>
+                      <a:endParaRPr lang="en-GB" sz="1400">
+                        <a:solidFill>
+                          <a:srgbClr val="8E8F8F"/>
+                        </a:solidFill>
+                        <a:latin typeface="Polaris Medium" panose="02000000000000000000" pitchFamily="50" charset="0"/>
+                        <a:ea typeface="Polaris Medium" panose="02000000000000000000" pitchFamily="50" charset="0"/>
+                        <a:cs typeface="Polaris Medium" panose="02000000000000000000" pitchFamily="50" charset="0"/>
+                      </a:endParaRPr>
+                    </a:p>
+                  </a:txBody>
+                  <a:tcPr>
+                    <a:solidFill>
+                      <a:srgbClr val="EFEFF0"/>
+                    </a:solidFill>
+                  </a:tcPr>
+                </a:tc>
+                <a:extLst>
+                  <a:ext uri="{0D108BD9-81ED-4DB2-BD59-A6C34878D82A}">
+                    <a16:rowId xmlns:a16="http://schemas.microsoft.com/office/drawing/2014/main" val="2299400171"/>
+                  </a:ext>
+                </a:extLst>
+              </a:tr>
+              <a:tr h="188095">
+                <a:tc>
+                  <a:txBody>
+                    <a:bodyPr/>
+                    <a:lstStyle/>
+                    <a:p>
+                      <a:r>
+                        <a:rPr lang="en-GB" sz="1200">
+                          <a:latin typeface="Polaris Medium" panose="02000000000000000000" pitchFamily="50" charset="0"/>
+                          <a:ea typeface="Polaris Medium" panose="02000000000000000000" pitchFamily="50" charset="0"/>
+                          <a:cs typeface="Polaris Medium" panose="02000000000000000000" pitchFamily="50" charset="0"/>
+                        </a:rPr>
+                        <a:t>S8 Mexico R3</a:t>
+                      </a:r>
+                    </a:p>
+                  </a:txBody>
+                  <a:tcPr>
+                    <a:solidFill>
+                      <a:srgbClr val="EFEFF0"/>
+                    </a:solidFill>
+                  </a:tcPr>
+                </a:tc>
+                <a:tc>
+                  <a:txBody>
+                    <a:bodyPr/>
+                    <a:lstStyle/>
+                    <a:p>
+                      <a:endParaRPr lang="en-GB" sz="1400">
+                        <a:latin typeface="Polaris Medium" panose="02000000000000000000" pitchFamily="50" charset="0"/>
+                        <a:ea typeface="Polaris Medium" panose="02000000000000000000" pitchFamily="50" charset="0"/>
+                        <a:cs typeface="Polaris Medium" panose="02000000000000000000" pitchFamily="50" charset="0"/>
+                      </a:endParaRPr>
+                    </a:p>
+                  </a:txBody>
+                  <a:tcPr>
+                    <a:solidFill>
+                      <a:srgbClr val="EFEFF0"/>
+                    </a:solidFill>
+                  </a:tcPr>
+                </a:tc>
+                <a:tc>
+                  <a:txBody>
+                    <a:bodyPr/>
+                    <a:lstStyle/>
+                    <a:p>
+                      <a:endParaRPr lang="en-GB" sz="1400">
+                        <a:latin typeface="Polaris Medium" panose="02000000000000000000" pitchFamily="50" charset="0"/>
+                        <a:ea typeface="Polaris Medium" panose="02000000000000000000" pitchFamily="50" charset="0"/>
+                        <a:cs typeface="Polaris Medium" panose="02000000000000000000" pitchFamily="50" charset="0"/>
+                      </a:endParaRPr>
+                    </a:p>
+                  </a:txBody>
+                  <a:tcPr>
+                    <a:solidFill>
+                      <a:srgbClr val="EFEFF0"/>
+                    </a:solidFill>
+                  </a:tcPr>
+                </a:tc>
+                <a:tc>
+                  <a:txBody>
+                    <a:bodyPr/>
+                    <a:lstStyle/>
+                    <a:p>
+                      <a:endParaRPr lang="en-GB" sz="1400" dirty="0">
+                        <a:latin typeface="Polaris Medium" panose="02000000000000000000" pitchFamily="50" charset="0"/>
+                        <a:ea typeface="Polaris Medium" panose="02000000000000000000" pitchFamily="50" charset="0"/>
+                        <a:cs typeface="Polaris Medium" panose="02000000000000000000" pitchFamily="50" charset="0"/>
+                      </a:endParaRPr>
+                    </a:p>
+                  </a:txBody>
+                  <a:tcPr>
+                    <a:solidFill>
+                      <a:srgbClr val="EFEFF0"/>
+                    </a:solidFill>
+                  </a:tcPr>
+                </a:tc>
+                <a:extLst>
+                  <a:ext uri="{0D108BD9-81ED-4DB2-BD59-A6C34878D82A}">
+                    <a16:rowId xmlns:a16="http://schemas.microsoft.com/office/drawing/2014/main" val="734385584"/>
+                  </a:ext>
+                </a:extLst>
+              </a:tr>
+            </a:tbl>
+          </a:graphicData>
+        </a:graphic>
+      </p:graphicFrame>
+    </p:spTree>
+    <p:extLst>
+      <p:ext uri="{BB962C8B-B14F-4D97-AF65-F5344CB8AC3E}">
+        <p14:creationId xmlns:p14="http://schemas.microsoft.com/office/powerpoint/2010/main" val="4143717026"/>
       </p:ext>
     </p:extLst>
   </p:cSld>

</xml_diff>

<commit_message>
Added the ability to alter hyperlinks attached to images.
</commit_message>
<xml_diff>
--- a/PowerPointEditorLib.Tests/ppt-examples/test.pptx
+++ b/PowerPointEditorLib.Tests/ppt-examples/test.pptx
@@ -2034,7 +2034,7 @@
           <a:p>
             <a:fld id="{F72DBBF0-3CD8-4197-8DE9-31F892749D5F}" type="datetimeFigureOut">
               <a:rPr lang="en-GB" smtClean="0"/>
-              <a:t>06/05/2022</a:t>
+              <a:t>16/06/2022</a:t>
             </a:fld>
             <a:endParaRPr lang="en-GB"/>
           </a:p>
@@ -2547,7 +2547,7 @@
           <a:p>
             <a:fld id="{61FD400D-99EE-4D14-892C-72662AB4C03C}" type="datetimeFigureOut">
               <a:rPr lang="en-GB" smtClean="0"/>
-              <a:t>06/05/2022</a:t>
+              <a:t>16/06/2022</a:t>
             </a:fld>
             <a:endParaRPr lang="en-GB"/>
           </a:p>
@@ -2747,7 +2747,7 @@
           <a:p>
             <a:fld id="{61FD400D-99EE-4D14-892C-72662AB4C03C}" type="datetimeFigureOut">
               <a:rPr lang="en-GB" smtClean="0"/>
-              <a:t>06/05/2022</a:t>
+              <a:t>16/06/2022</a:t>
             </a:fld>
             <a:endParaRPr lang="en-GB"/>
           </a:p>
@@ -2957,7 +2957,7 @@
           <a:p>
             <a:fld id="{61FD400D-99EE-4D14-892C-72662AB4C03C}" type="datetimeFigureOut">
               <a:rPr lang="en-GB" smtClean="0"/>
-              <a:t>06/05/2022</a:t>
+              <a:t>16/06/2022</a:t>
             </a:fld>
             <a:endParaRPr lang="en-GB"/>
           </a:p>
@@ -3157,7 +3157,7 @@
           <a:p>
             <a:fld id="{61FD400D-99EE-4D14-892C-72662AB4C03C}" type="datetimeFigureOut">
               <a:rPr lang="en-GB" smtClean="0"/>
-              <a:t>06/05/2022</a:t>
+              <a:t>16/06/2022</a:t>
             </a:fld>
             <a:endParaRPr lang="en-GB"/>
           </a:p>
@@ -3433,7 +3433,7 @@
           <a:p>
             <a:fld id="{61FD400D-99EE-4D14-892C-72662AB4C03C}" type="datetimeFigureOut">
               <a:rPr lang="en-GB" smtClean="0"/>
-              <a:t>06/05/2022</a:t>
+              <a:t>16/06/2022</a:t>
             </a:fld>
             <a:endParaRPr lang="en-GB"/>
           </a:p>
@@ -3701,7 +3701,7 @@
           <a:p>
             <a:fld id="{61FD400D-99EE-4D14-892C-72662AB4C03C}" type="datetimeFigureOut">
               <a:rPr lang="en-GB" smtClean="0"/>
-              <a:t>06/05/2022</a:t>
+              <a:t>16/06/2022</a:t>
             </a:fld>
             <a:endParaRPr lang="en-GB"/>
           </a:p>
@@ -4116,7 +4116,7 @@
           <a:p>
             <a:fld id="{61FD400D-99EE-4D14-892C-72662AB4C03C}" type="datetimeFigureOut">
               <a:rPr lang="en-GB" smtClean="0"/>
-              <a:t>06/05/2022</a:t>
+              <a:t>16/06/2022</a:t>
             </a:fld>
             <a:endParaRPr lang="en-GB"/>
           </a:p>
@@ -4258,7 +4258,7 @@
           <a:p>
             <a:fld id="{61FD400D-99EE-4D14-892C-72662AB4C03C}" type="datetimeFigureOut">
               <a:rPr lang="en-GB" smtClean="0"/>
-              <a:t>06/05/2022</a:t>
+              <a:t>16/06/2022</a:t>
             </a:fld>
             <a:endParaRPr lang="en-GB"/>
           </a:p>
@@ -4371,7 +4371,7 @@
           <a:p>
             <a:fld id="{61FD400D-99EE-4D14-892C-72662AB4C03C}" type="datetimeFigureOut">
               <a:rPr lang="en-GB" smtClean="0"/>
-              <a:t>06/05/2022</a:t>
+              <a:t>16/06/2022</a:t>
             </a:fld>
             <a:endParaRPr lang="en-GB"/>
           </a:p>
@@ -4684,7 +4684,7 @@
           <a:p>
             <a:fld id="{61FD400D-99EE-4D14-892C-72662AB4C03C}" type="datetimeFigureOut">
               <a:rPr lang="en-GB" smtClean="0"/>
-              <a:t>06/05/2022</a:t>
+              <a:t>16/06/2022</a:t>
             </a:fld>
             <a:endParaRPr lang="en-GB"/>
           </a:p>
@@ -4973,7 +4973,7 @@
           <a:p>
             <a:fld id="{61FD400D-99EE-4D14-892C-72662AB4C03C}" type="datetimeFigureOut">
               <a:rPr lang="en-GB" smtClean="0"/>
-              <a:t>06/05/2022</a:t>
+              <a:t>16/06/2022</a:t>
             </a:fld>
             <a:endParaRPr lang="en-GB"/>
           </a:p>
@@ -5216,7 +5216,7 @@
           <a:p>
             <a:fld id="{61FD400D-99EE-4D14-892C-72662AB4C03C}" type="datetimeFigureOut">
               <a:rPr lang="en-GB" smtClean="0"/>
-              <a:t>06/05/2022</a:t>
+              <a:t>16/06/2022</a:t>
             </a:fld>
             <a:endParaRPr lang="en-GB"/>
           </a:p>
@@ -5753,6 +5753,7 @@
       <p:pic>
         <p:nvPicPr>
           <p:cNvPr id="7" name="Picture 6" descr="Slide 2 Image">
+            <a:hlinkClick r:id="rId3"/>
             <a:extLst>
               <a:ext uri="{FF2B5EF4-FFF2-40B4-BE49-F238E27FC236}">
                 <a16:creationId xmlns:a16="http://schemas.microsoft.com/office/drawing/2014/main" id="{BDCE62A6-B6C4-49DF-A20C-2C50D609000C}"/>
@@ -5765,7 +5766,7 @@
           <p:nvPr/>
         </p:nvPicPr>
         <p:blipFill>
-          <a:blip r:embed="rId3">
+          <a:blip r:embed="rId4">
             <a:extLst>
               <a:ext uri="{28A0092B-C50C-407E-A947-70E740481C1C}">
                 <a14:useLocalDpi xmlns:a14="http://schemas.microsoft.com/office/drawing/2010/main" val="0"/>

</xml_diff>

<commit_message>
Added the ability to merge serval paragraphs (due to styling changes) into one paragraph with the first entries styling.
Added console app for debugging.
</commit_message>
<xml_diff>
--- a/PowerPointEditorLib.Tests/ppt-examples/test.pptx
+++ b/PowerPointEditorLib.Tests/ppt-examples/test.pptx
@@ -2034,7 +2034,7 @@
           <a:p>
             <a:fld id="{F72DBBF0-3CD8-4197-8DE9-31F892749D5F}" type="datetimeFigureOut">
               <a:rPr lang="en-GB" smtClean="0"/>
-              <a:t>16/06/2022</a:t>
+              <a:t>29/06/2022</a:t>
             </a:fld>
             <a:endParaRPr lang="en-GB"/>
           </a:p>
@@ -2547,7 +2547,7 @@
           <a:p>
             <a:fld id="{61FD400D-99EE-4D14-892C-72662AB4C03C}" type="datetimeFigureOut">
               <a:rPr lang="en-GB" smtClean="0"/>
-              <a:t>16/06/2022</a:t>
+              <a:t>29/06/2022</a:t>
             </a:fld>
             <a:endParaRPr lang="en-GB"/>
           </a:p>
@@ -2747,7 +2747,7 @@
           <a:p>
             <a:fld id="{61FD400D-99EE-4D14-892C-72662AB4C03C}" type="datetimeFigureOut">
               <a:rPr lang="en-GB" smtClean="0"/>
-              <a:t>16/06/2022</a:t>
+              <a:t>29/06/2022</a:t>
             </a:fld>
             <a:endParaRPr lang="en-GB"/>
           </a:p>
@@ -2957,7 +2957,7 @@
           <a:p>
             <a:fld id="{61FD400D-99EE-4D14-892C-72662AB4C03C}" type="datetimeFigureOut">
               <a:rPr lang="en-GB" smtClean="0"/>
-              <a:t>16/06/2022</a:t>
+              <a:t>29/06/2022</a:t>
             </a:fld>
             <a:endParaRPr lang="en-GB"/>
           </a:p>
@@ -3157,7 +3157,7 @@
           <a:p>
             <a:fld id="{61FD400D-99EE-4D14-892C-72662AB4C03C}" type="datetimeFigureOut">
               <a:rPr lang="en-GB" smtClean="0"/>
-              <a:t>16/06/2022</a:t>
+              <a:t>29/06/2022</a:t>
             </a:fld>
             <a:endParaRPr lang="en-GB"/>
           </a:p>
@@ -3433,7 +3433,7 @@
           <a:p>
             <a:fld id="{61FD400D-99EE-4D14-892C-72662AB4C03C}" type="datetimeFigureOut">
               <a:rPr lang="en-GB" smtClean="0"/>
-              <a:t>16/06/2022</a:t>
+              <a:t>29/06/2022</a:t>
             </a:fld>
             <a:endParaRPr lang="en-GB"/>
           </a:p>
@@ -3701,7 +3701,7 @@
           <a:p>
             <a:fld id="{61FD400D-99EE-4D14-892C-72662AB4C03C}" type="datetimeFigureOut">
               <a:rPr lang="en-GB" smtClean="0"/>
-              <a:t>16/06/2022</a:t>
+              <a:t>29/06/2022</a:t>
             </a:fld>
             <a:endParaRPr lang="en-GB"/>
           </a:p>
@@ -4116,7 +4116,7 @@
           <a:p>
             <a:fld id="{61FD400D-99EE-4D14-892C-72662AB4C03C}" type="datetimeFigureOut">
               <a:rPr lang="en-GB" smtClean="0"/>
-              <a:t>16/06/2022</a:t>
+              <a:t>29/06/2022</a:t>
             </a:fld>
             <a:endParaRPr lang="en-GB"/>
           </a:p>
@@ -4258,7 +4258,7 @@
           <a:p>
             <a:fld id="{61FD400D-99EE-4D14-892C-72662AB4C03C}" type="datetimeFigureOut">
               <a:rPr lang="en-GB" smtClean="0"/>
-              <a:t>16/06/2022</a:t>
+              <a:t>29/06/2022</a:t>
             </a:fld>
             <a:endParaRPr lang="en-GB"/>
           </a:p>
@@ -4371,7 +4371,7 @@
           <a:p>
             <a:fld id="{61FD400D-99EE-4D14-892C-72662AB4C03C}" type="datetimeFigureOut">
               <a:rPr lang="en-GB" smtClean="0"/>
-              <a:t>16/06/2022</a:t>
+              <a:t>29/06/2022</a:t>
             </a:fld>
             <a:endParaRPr lang="en-GB"/>
           </a:p>
@@ -4684,7 +4684,7 @@
           <a:p>
             <a:fld id="{61FD400D-99EE-4D14-892C-72662AB4C03C}" type="datetimeFigureOut">
               <a:rPr lang="en-GB" smtClean="0"/>
-              <a:t>16/06/2022</a:t>
+              <a:t>29/06/2022</a:t>
             </a:fld>
             <a:endParaRPr lang="en-GB"/>
           </a:p>
@@ -4973,7 +4973,7 @@
           <a:p>
             <a:fld id="{61FD400D-99EE-4D14-892C-72662AB4C03C}" type="datetimeFigureOut">
               <a:rPr lang="en-GB" smtClean="0"/>
-              <a:t>16/06/2022</a:t>
+              <a:t>29/06/2022</a:t>
             </a:fld>
             <a:endParaRPr lang="en-GB"/>
           </a:p>
@@ -5216,7 +5216,7 @@
           <a:p>
             <a:fld id="{61FD400D-99EE-4D14-892C-72662AB4C03C}" type="datetimeFigureOut">
               <a:rPr lang="en-GB" smtClean="0"/>
-              <a:t>16/06/2022</a:t>
+              <a:t>29/06/2022</a:t>
             </a:fld>
             <a:endParaRPr lang="en-GB"/>
           </a:p>
@@ -5787,6 +5787,107 @@
           </a:prstGeom>
         </p:spPr>
       </p:pic>
+      <p:sp>
+        <p:nvSpPr>
+          <p:cNvPr id="4" name="TextBox 3">
+            <a:extLst>
+              <a:ext uri="{FF2B5EF4-FFF2-40B4-BE49-F238E27FC236}">
+                <a16:creationId xmlns:a16="http://schemas.microsoft.com/office/drawing/2014/main" id="{D57C4413-2B53-5277-1717-8B56FA53F289}"/>
+              </a:ext>
+            </a:extLst>
+          </p:cNvPr>
+          <p:cNvSpPr txBox="1"/>
+          <p:nvPr/>
+        </p:nvSpPr>
+        <p:spPr>
+          <a:xfrm>
+            <a:off x="5638800" y="2974427"/>
+            <a:ext cx="914400" cy="914400"/>
+          </a:xfrm>
+          <a:prstGeom prst="rect">
+            <a:avLst/>
+          </a:prstGeom>
+          <a:noFill/>
+        </p:spPr>
+        <p:txBody>
+          <a:bodyPr wrap="square" rtlCol="0">
+            <a:spAutoFit/>
+          </a:bodyPr>
+          <a:lstStyle/>
+          <a:p>
+            <a:endParaRPr lang="en-GB" dirty="0"/>
+          </a:p>
+        </p:txBody>
+      </p:sp>
+      <p:sp>
+        <p:nvSpPr>
+          <p:cNvPr id="5" name="TextBox 4">
+            <a:extLst>
+              <a:ext uri="{FF2B5EF4-FFF2-40B4-BE49-F238E27FC236}">
+                <a16:creationId xmlns:a16="http://schemas.microsoft.com/office/drawing/2014/main" id="{04BC3FFD-D6E9-DFB6-BD6A-EC7CF9B8FEA2}"/>
+              </a:ext>
+            </a:extLst>
+          </p:cNvPr>
+          <p:cNvSpPr txBox="1"/>
+          <p:nvPr/>
+        </p:nvSpPr>
+        <p:spPr>
+          <a:xfrm>
+            <a:off x="977462" y="3270415"/>
+            <a:ext cx="2007476" cy="2308324"/>
+          </a:xfrm>
+          <a:prstGeom prst="rect">
+            <a:avLst/>
+          </a:prstGeom>
+          <a:noFill/>
+        </p:spPr>
+        <p:txBody>
+          <a:bodyPr wrap="square" rtlCol="0">
+            <a:spAutoFit/>
+          </a:bodyPr>
+          <a:lstStyle/>
+          <a:p>
+            <a:r>
+              <a:rPr lang="en-GB" dirty="0"/>
+              <a:t>This is more text </a:t>
+            </a:r>
+            <a:r>
+              <a:rPr lang="en-GB" sz="2400" b="1" dirty="0">
+                <a:solidFill>
+                  <a:srgbClr val="FF0000"/>
+                </a:solidFill>
+              </a:rPr>
+              <a:t>{with styling to </a:t>
+            </a:r>
+            <a:r>
+              <a:rPr lang="en-GB" sz="3600" b="1" dirty="0">
+                <a:solidFill>
+                  <a:schemeClr val="tx1">
+                    <a:lumMod val="95000"/>
+                    <a:lumOff val="5000"/>
+                  </a:schemeClr>
+                </a:solidFill>
+                <a:highlight>
+                  <a:srgbClr val="FF0000"/>
+                </a:highlight>
+              </a:rPr>
+              <a:t>break</a:t>
+            </a:r>
+            <a:r>
+              <a:rPr lang="en-GB" sz="2400" b="1" dirty="0">
+                <a:solidFill>
+                  <a:srgbClr val="FF0000"/>
+                </a:solidFill>
+              </a:rPr>
+              <a:t> to the paragraph}</a:t>
+            </a:r>
+            <a:r>
+              <a:rPr lang="en-GB" dirty="0"/>
+              <a:t> hopefully</a:t>
+            </a:r>
+          </a:p>
+        </p:txBody>
+      </p:sp>
     </p:spTree>
     <p:extLst>
       <p:ext uri="{BB962C8B-B14F-4D97-AF65-F5344CB8AC3E}">

</xml_diff>

<commit_message>
Updated tests and readme
</commit_message>
<xml_diff>
--- a/PowerPointEditorLib.Tests/ppt-examples/test.pptx
+++ b/PowerPointEditorLib.Tests/ppt-examples/test.pptx
@@ -2034,7 +2034,7 @@
           <a:p>
             <a:fld id="{F72DBBF0-3CD8-4197-8DE9-31F892749D5F}" type="datetimeFigureOut">
               <a:rPr lang="en-GB" smtClean="0"/>
-              <a:t>29/06/2022</a:t>
+              <a:t>25/07/2022</a:t>
             </a:fld>
             <a:endParaRPr lang="en-GB"/>
           </a:p>
@@ -2547,7 +2547,7 @@
           <a:p>
             <a:fld id="{61FD400D-99EE-4D14-892C-72662AB4C03C}" type="datetimeFigureOut">
               <a:rPr lang="en-GB" smtClean="0"/>
-              <a:t>29/06/2022</a:t>
+              <a:t>25/07/2022</a:t>
             </a:fld>
             <a:endParaRPr lang="en-GB"/>
           </a:p>
@@ -2747,7 +2747,7 @@
           <a:p>
             <a:fld id="{61FD400D-99EE-4D14-892C-72662AB4C03C}" type="datetimeFigureOut">
               <a:rPr lang="en-GB" smtClean="0"/>
-              <a:t>29/06/2022</a:t>
+              <a:t>25/07/2022</a:t>
             </a:fld>
             <a:endParaRPr lang="en-GB"/>
           </a:p>
@@ -2957,7 +2957,7 @@
           <a:p>
             <a:fld id="{61FD400D-99EE-4D14-892C-72662AB4C03C}" type="datetimeFigureOut">
               <a:rPr lang="en-GB" smtClean="0"/>
-              <a:t>29/06/2022</a:t>
+              <a:t>25/07/2022</a:t>
             </a:fld>
             <a:endParaRPr lang="en-GB"/>
           </a:p>
@@ -3157,7 +3157,7 @@
           <a:p>
             <a:fld id="{61FD400D-99EE-4D14-892C-72662AB4C03C}" type="datetimeFigureOut">
               <a:rPr lang="en-GB" smtClean="0"/>
-              <a:t>29/06/2022</a:t>
+              <a:t>25/07/2022</a:t>
             </a:fld>
             <a:endParaRPr lang="en-GB"/>
           </a:p>
@@ -3433,7 +3433,7 @@
           <a:p>
             <a:fld id="{61FD400D-99EE-4D14-892C-72662AB4C03C}" type="datetimeFigureOut">
               <a:rPr lang="en-GB" smtClean="0"/>
-              <a:t>29/06/2022</a:t>
+              <a:t>25/07/2022</a:t>
             </a:fld>
             <a:endParaRPr lang="en-GB"/>
           </a:p>
@@ -3701,7 +3701,7 @@
           <a:p>
             <a:fld id="{61FD400D-99EE-4D14-892C-72662AB4C03C}" type="datetimeFigureOut">
               <a:rPr lang="en-GB" smtClean="0"/>
-              <a:t>29/06/2022</a:t>
+              <a:t>25/07/2022</a:t>
             </a:fld>
             <a:endParaRPr lang="en-GB"/>
           </a:p>
@@ -4116,7 +4116,7 @@
           <a:p>
             <a:fld id="{61FD400D-99EE-4D14-892C-72662AB4C03C}" type="datetimeFigureOut">
               <a:rPr lang="en-GB" smtClean="0"/>
-              <a:t>29/06/2022</a:t>
+              <a:t>25/07/2022</a:t>
             </a:fld>
             <a:endParaRPr lang="en-GB"/>
           </a:p>
@@ -4258,7 +4258,7 @@
           <a:p>
             <a:fld id="{61FD400D-99EE-4D14-892C-72662AB4C03C}" type="datetimeFigureOut">
               <a:rPr lang="en-GB" smtClean="0"/>
-              <a:t>29/06/2022</a:t>
+              <a:t>25/07/2022</a:t>
             </a:fld>
             <a:endParaRPr lang="en-GB"/>
           </a:p>
@@ -4371,7 +4371,7 @@
           <a:p>
             <a:fld id="{61FD400D-99EE-4D14-892C-72662AB4C03C}" type="datetimeFigureOut">
               <a:rPr lang="en-GB" smtClean="0"/>
-              <a:t>29/06/2022</a:t>
+              <a:t>25/07/2022</a:t>
             </a:fld>
             <a:endParaRPr lang="en-GB"/>
           </a:p>
@@ -4684,7 +4684,7 @@
           <a:p>
             <a:fld id="{61FD400D-99EE-4D14-892C-72662AB4C03C}" type="datetimeFigureOut">
               <a:rPr lang="en-GB" smtClean="0"/>
-              <a:t>29/06/2022</a:t>
+              <a:t>25/07/2022</a:t>
             </a:fld>
             <a:endParaRPr lang="en-GB"/>
           </a:p>
@@ -4973,7 +4973,7 @@
           <a:p>
             <a:fld id="{61FD400D-99EE-4D14-892C-72662AB4C03C}" type="datetimeFigureOut">
               <a:rPr lang="en-GB" smtClean="0"/>
-              <a:t>29/06/2022</a:t>
+              <a:t>25/07/2022</a:t>
             </a:fld>
             <a:endParaRPr lang="en-GB"/>
           </a:p>
@@ -5216,7 +5216,7 @@
           <a:p>
             <a:fld id="{61FD400D-99EE-4D14-892C-72662AB4C03C}" type="datetimeFigureOut">
               <a:rPr lang="en-GB" smtClean="0"/>
-              <a:t>29/06/2022</a:t>
+              <a:t>25/07/2022</a:t>
             </a:fld>
             <a:endParaRPr lang="en-GB"/>
           </a:p>
@@ -6096,6 +6096,42 @@
           </a:graphicData>
         </a:graphic>
       </p:graphicFrame>
+      <p:pic>
+        <p:nvPicPr>
+          <p:cNvPr id="4" name="Picture 3" descr="ReplaceAllImages">
+            <a:extLst>
+              <a:ext uri="{FF2B5EF4-FFF2-40B4-BE49-F238E27FC236}">
+                <a16:creationId xmlns:a16="http://schemas.microsoft.com/office/drawing/2014/main" id="{E502BD78-40C0-3520-ED5F-D96E2C092676}"/>
+              </a:ext>
+            </a:extLst>
+          </p:cNvPr>
+          <p:cNvPicPr>
+            <a:picLocks noChangeAspect="1"/>
+          </p:cNvPicPr>
+          <p:nvPr/>
+        </p:nvPicPr>
+        <p:blipFill>
+          <a:blip r:embed="rId3">
+            <a:extLst>
+              <a:ext uri="{28A0092B-C50C-407E-A947-70E740481C1C}">
+                <a14:useLocalDpi xmlns:a14="http://schemas.microsoft.com/office/drawing/2010/main" val="0"/>
+              </a:ext>
+            </a:extLst>
+          </a:blip>
+          <a:stretch>
+            <a:fillRect/>
+          </a:stretch>
+        </p:blipFill>
+        <p:spPr>
+          <a:xfrm>
+            <a:off x="559392" y="5124085"/>
+            <a:ext cx="1751416" cy="1014248"/>
+          </a:xfrm>
+          <a:prstGeom prst="rect">
+            <a:avLst/>
+          </a:prstGeom>
+        </p:spPr>
+      </p:pic>
     </p:spTree>
     <p:extLst>
       <p:ext uri="{BB962C8B-B14F-4D97-AF65-F5344CB8AC3E}">
@@ -6783,6 +6819,42 @@
           </a:graphicData>
         </a:graphic>
       </p:graphicFrame>
+      <p:pic>
+        <p:nvPicPr>
+          <p:cNvPr id="3" name="Picture 2" descr="ReplaceAllImages">
+            <a:extLst>
+              <a:ext uri="{FF2B5EF4-FFF2-40B4-BE49-F238E27FC236}">
+                <a16:creationId xmlns:a16="http://schemas.microsoft.com/office/drawing/2014/main" id="{D21AEFB7-B825-44B2-3B12-412A3C167969}"/>
+              </a:ext>
+            </a:extLst>
+          </p:cNvPr>
+          <p:cNvPicPr>
+            <a:picLocks noChangeAspect="1"/>
+          </p:cNvPicPr>
+          <p:nvPr/>
+        </p:nvPicPr>
+        <p:blipFill>
+          <a:blip r:embed="rId2">
+            <a:extLst>
+              <a:ext uri="{28A0092B-C50C-407E-A947-70E740481C1C}">
+                <a14:useLocalDpi xmlns:a14="http://schemas.microsoft.com/office/drawing/2010/main" val="0"/>
+              </a:ext>
+            </a:extLst>
+          </a:blip>
+          <a:stretch>
+            <a:fillRect/>
+          </a:stretch>
+        </p:blipFill>
+        <p:spPr>
+          <a:xfrm>
+            <a:off x="482092" y="4695218"/>
+            <a:ext cx="1788143" cy="1192688"/>
+          </a:xfrm>
+          <a:prstGeom prst="rect">
+            <a:avLst/>
+          </a:prstGeom>
+        </p:spPr>
+      </p:pic>
     </p:spTree>
     <p:extLst>
       <p:ext uri="{BB962C8B-B14F-4D97-AF65-F5344CB8AC3E}">

</xml_diff>